<commit_message>
Modified report about functions
</commit_message>
<xml_diff>
--- a/reports/functions/functions.pptx
+++ b/reports/functions/functions.pptx
@@ -6,12 +6,20 @@
   </p:sldMasterIdLst>
   <p:sldIdLst>
     <p:sldId id="256" r:id="rId2"/>
-    <p:sldId id="257" r:id="rId3"/>
-    <p:sldId id="260" r:id="rId4"/>
-    <p:sldId id="258" r:id="rId5"/>
-    <p:sldId id="259" r:id="rId6"/>
-    <p:sldId id="261" r:id="rId7"/>
-    <p:sldId id="262" r:id="rId8"/>
+    <p:sldId id="265" r:id="rId3"/>
+    <p:sldId id="270" r:id="rId4"/>
+    <p:sldId id="257" r:id="rId5"/>
+    <p:sldId id="263" r:id="rId6"/>
+    <p:sldId id="273" r:id="rId7"/>
+    <p:sldId id="271" r:id="rId8"/>
+    <p:sldId id="272" r:id="rId9"/>
+    <p:sldId id="268" r:id="rId10"/>
+    <p:sldId id="269" r:id="rId11"/>
+    <p:sldId id="266" r:id="rId12"/>
+    <p:sldId id="267" r:id="rId13"/>
+    <p:sldId id="274" r:id="rId14"/>
+    <p:sldId id="261" r:id="rId15"/>
+    <p:sldId id="262" r:id="rId16"/>
   </p:sldIdLst>
   <p:sldSz cx="12192000" cy="6858000"/>
   <p:notesSz cx="6858000" cy="9144000"/>
@@ -265,7 +273,7 @@
           <a:p>
             <a:fld id="{64F5C602-8F22-4B35-A779-10F9AFEE1296}" type="datetimeFigureOut">
               <a:rPr lang="ru-RU" smtClean="0"/>
-              <a:t>30.09.2023</a:t>
+              <a:t>01.10.2023</a:t>
             </a:fld>
             <a:endParaRPr lang="ru-RU"/>
           </a:p>
@@ -463,7 +471,7 @@
           <a:p>
             <a:fld id="{64F5C602-8F22-4B35-A779-10F9AFEE1296}" type="datetimeFigureOut">
               <a:rPr lang="ru-RU" smtClean="0"/>
-              <a:t>30.09.2023</a:t>
+              <a:t>01.10.2023</a:t>
             </a:fld>
             <a:endParaRPr lang="ru-RU"/>
           </a:p>
@@ -671,7 +679,7 @@
           <a:p>
             <a:fld id="{64F5C602-8F22-4B35-A779-10F9AFEE1296}" type="datetimeFigureOut">
               <a:rPr lang="ru-RU" smtClean="0"/>
-              <a:t>30.09.2023</a:t>
+              <a:t>01.10.2023</a:t>
             </a:fld>
             <a:endParaRPr lang="ru-RU"/>
           </a:p>
@@ -869,7 +877,7 @@
           <a:p>
             <a:fld id="{64F5C602-8F22-4B35-A779-10F9AFEE1296}" type="datetimeFigureOut">
               <a:rPr lang="ru-RU" smtClean="0"/>
-              <a:t>30.09.2023</a:t>
+              <a:t>01.10.2023</a:t>
             </a:fld>
             <a:endParaRPr lang="ru-RU"/>
           </a:p>
@@ -1144,7 +1152,7 @@
           <a:p>
             <a:fld id="{64F5C602-8F22-4B35-A779-10F9AFEE1296}" type="datetimeFigureOut">
               <a:rPr lang="ru-RU" smtClean="0"/>
-              <a:t>30.09.2023</a:t>
+              <a:t>01.10.2023</a:t>
             </a:fld>
             <a:endParaRPr lang="ru-RU"/>
           </a:p>
@@ -1409,7 +1417,7 @@
           <a:p>
             <a:fld id="{64F5C602-8F22-4B35-A779-10F9AFEE1296}" type="datetimeFigureOut">
               <a:rPr lang="ru-RU" smtClean="0"/>
-              <a:t>30.09.2023</a:t>
+              <a:t>01.10.2023</a:t>
             </a:fld>
             <a:endParaRPr lang="ru-RU"/>
           </a:p>
@@ -1821,7 +1829,7 @@
           <a:p>
             <a:fld id="{64F5C602-8F22-4B35-A779-10F9AFEE1296}" type="datetimeFigureOut">
               <a:rPr lang="ru-RU" smtClean="0"/>
-              <a:t>30.09.2023</a:t>
+              <a:t>01.10.2023</a:t>
             </a:fld>
             <a:endParaRPr lang="ru-RU"/>
           </a:p>
@@ -1962,7 +1970,7 @@
           <a:p>
             <a:fld id="{64F5C602-8F22-4B35-A779-10F9AFEE1296}" type="datetimeFigureOut">
               <a:rPr lang="ru-RU" smtClean="0"/>
-              <a:t>30.09.2023</a:t>
+              <a:t>01.10.2023</a:t>
             </a:fld>
             <a:endParaRPr lang="ru-RU"/>
           </a:p>
@@ -2075,7 +2083,7 @@
           <a:p>
             <a:fld id="{64F5C602-8F22-4B35-A779-10F9AFEE1296}" type="datetimeFigureOut">
               <a:rPr lang="ru-RU" smtClean="0"/>
-              <a:t>30.09.2023</a:t>
+              <a:t>01.10.2023</a:t>
             </a:fld>
             <a:endParaRPr lang="ru-RU"/>
           </a:p>
@@ -2386,7 +2394,7 @@
           <a:p>
             <a:fld id="{64F5C602-8F22-4B35-A779-10F9AFEE1296}" type="datetimeFigureOut">
               <a:rPr lang="ru-RU" smtClean="0"/>
-              <a:t>30.09.2023</a:t>
+              <a:t>01.10.2023</a:t>
             </a:fld>
             <a:endParaRPr lang="ru-RU"/>
           </a:p>
@@ -2674,7 +2682,7 @@
           <a:p>
             <a:fld id="{64F5C602-8F22-4B35-A779-10F9AFEE1296}" type="datetimeFigureOut">
               <a:rPr lang="ru-RU" smtClean="0"/>
-              <a:t>30.09.2023</a:t>
+              <a:t>01.10.2023</a:t>
             </a:fld>
             <a:endParaRPr lang="ru-RU"/>
           </a:p>
@@ -2915,7 +2923,7 @@
           <a:p>
             <a:fld id="{64F5C602-8F22-4B35-A779-10F9AFEE1296}" type="datetimeFigureOut">
               <a:rPr lang="ru-RU" smtClean="0"/>
-              <a:t>30.09.2023</a:t>
+              <a:t>01.10.2023</a:t>
             </a:fld>
             <a:endParaRPr lang="ru-RU"/>
           </a:p>
@@ -3410,6 +3418,1123 @@
 </p:sld>
 </file>
 
+<file path=ppt/slides/slide10.xml><?xml version="1.0" encoding="utf-8"?>
+<p:sld xmlns:a="http://schemas.openxmlformats.org/drawingml/2006/main" xmlns:r="http://schemas.openxmlformats.org/officeDocument/2006/relationships" xmlns:p="http://schemas.openxmlformats.org/presentationml/2006/main">
+  <p:cSld>
+    <p:spTree>
+      <p:nvGrpSpPr>
+        <p:cNvPr id="1" name=""/>
+        <p:cNvGrpSpPr/>
+        <p:nvPr/>
+      </p:nvGrpSpPr>
+      <p:grpSpPr>
+        <a:xfrm>
+          <a:off x="0" y="0"/>
+          <a:ext cx="0" cy="0"/>
+          <a:chOff x="0" y="0"/>
+          <a:chExt cx="0" cy="0"/>
+        </a:xfrm>
+      </p:grpSpPr>
+      <p:sp>
+        <p:nvSpPr>
+          <p:cNvPr id="4" name="Заголовок 3">
+            <a:extLst>
+              <a:ext uri="{FF2B5EF4-FFF2-40B4-BE49-F238E27FC236}">
+                <a16:creationId xmlns:a16="http://schemas.microsoft.com/office/drawing/2014/main" id="{CE228031-626F-2E9C-A281-6879BD35A796}"/>
+              </a:ext>
+            </a:extLst>
+          </p:cNvPr>
+          <p:cNvSpPr>
+            <a:spLocks noGrp="1"/>
+          </p:cNvSpPr>
+          <p:nvPr>
+            <p:ph type="title"/>
+          </p:nvPr>
+        </p:nvSpPr>
+        <p:spPr/>
+        <p:txBody>
+          <a:bodyPr/>
+          <a:lstStyle/>
+          <a:p>
+            <a:r>
+              <a:rPr lang="ru-RU" dirty="0"/>
+              <a:t>Некоторые примеры…</a:t>
+            </a:r>
+          </a:p>
+        </p:txBody>
+      </p:sp>
+      <p:pic>
+        <p:nvPicPr>
+          <p:cNvPr id="3" name="Рисунок 2">
+            <a:extLst>
+              <a:ext uri="{FF2B5EF4-FFF2-40B4-BE49-F238E27FC236}">
+                <a16:creationId xmlns:a16="http://schemas.microsoft.com/office/drawing/2014/main" id="{DC05F804-ECE8-BCDA-01D9-FFDEFE18603C}"/>
+              </a:ext>
+            </a:extLst>
+          </p:cNvPr>
+          <p:cNvPicPr>
+            <a:picLocks noChangeAspect="1"/>
+          </p:cNvPicPr>
+          <p:nvPr/>
+        </p:nvPicPr>
+        <p:blipFill>
+          <a:blip r:embed="rId2"/>
+          <a:stretch>
+            <a:fillRect/>
+          </a:stretch>
+        </p:blipFill>
+        <p:spPr>
+          <a:xfrm>
+            <a:off x="970711" y="1392931"/>
+            <a:ext cx="3910853" cy="4234063"/>
+          </a:xfrm>
+          <a:prstGeom prst="rect">
+            <a:avLst/>
+          </a:prstGeom>
+        </p:spPr>
+      </p:pic>
+      <p:sp>
+        <p:nvSpPr>
+          <p:cNvPr id="8" name="TextBox 7">
+            <a:extLst>
+              <a:ext uri="{FF2B5EF4-FFF2-40B4-BE49-F238E27FC236}">
+                <a16:creationId xmlns:a16="http://schemas.microsoft.com/office/drawing/2014/main" id="{970BABD5-563E-A69E-3A6A-E8DF2171DF24}"/>
+              </a:ext>
+            </a:extLst>
+          </p:cNvPr>
+          <p:cNvSpPr txBox="1"/>
+          <p:nvPr/>
+        </p:nvSpPr>
+        <p:spPr>
+          <a:xfrm>
+            <a:off x="4881564" y="1392931"/>
+            <a:ext cx="1329575" cy="646331"/>
+          </a:xfrm>
+          <a:prstGeom prst="rect">
+            <a:avLst/>
+          </a:prstGeom>
+          <a:noFill/>
+        </p:spPr>
+        <p:txBody>
+          <a:bodyPr wrap="square" rtlCol="0">
+            <a:spAutoFit/>
+          </a:bodyPr>
+          <a:lstStyle/>
+          <a:p>
+            <a:r>
+              <a:rPr lang="en-US" u="sng" dirty="0">
+                <a:latin typeface="Courier New" panose="02070309020205020404" pitchFamily="49" charset="0"/>
+                <a:cs typeface="Courier New" panose="02070309020205020404" pitchFamily="49" charset="0"/>
+              </a:rPr>
+              <a:t>Console:</a:t>
+            </a:r>
+          </a:p>
+          <a:p>
+            <a:r>
+              <a:rPr lang="en-US" dirty="0">
+                <a:latin typeface="Courier New" panose="02070309020205020404" pitchFamily="49" charset="0"/>
+                <a:cs typeface="Courier New" panose="02070309020205020404" pitchFamily="49" charset="0"/>
+              </a:rPr>
+              <a:t>20</a:t>
+            </a:r>
+            <a:endParaRPr lang="ru-RU" dirty="0">
+              <a:latin typeface="Courier New" panose="02070309020205020404" pitchFamily="49" charset="0"/>
+              <a:cs typeface="Courier New" panose="02070309020205020404" pitchFamily="49" charset="0"/>
+            </a:endParaRPr>
+          </a:p>
+        </p:txBody>
+      </p:sp>
+      <p:pic>
+        <p:nvPicPr>
+          <p:cNvPr id="10" name="Рисунок 9">
+            <a:extLst>
+              <a:ext uri="{FF2B5EF4-FFF2-40B4-BE49-F238E27FC236}">
+                <a16:creationId xmlns:a16="http://schemas.microsoft.com/office/drawing/2014/main" id="{B552EE52-114E-CA24-A44D-EE8F5FD69E32}"/>
+              </a:ext>
+            </a:extLst>
+          </p:cNvPr>
+          <p:cNvPicPr>
+            <a:picLocks noChangeAspect="1"/>
+          </p:cNvPicPr>
+          <p:nvPr/>
+        </p:nvPicPr>
+        <p:blipFill>
+          <a:blip r:embed="rId3"/>
+          <a:stretch>
+            <a:fillRect/>
+          </a:stretch>
+        </p:blipFill>
+        <p:spPr>
+          <a:xfrm>
+            <a:off x="6317621" y="1357291"/>
+            <a:ext cx="3829950" cy="4948338"/>
+          </a:xfrm>
+          <a:prstGeom prst="rect">
+            <a:avLst/>
+          </a:prstGeom>
+        </p:spPr>
+      </p:pic>
+      <p:sp>
+        <p:nvSpPr>
+          <p:cNvPr id="12" name="TextBox 11">
+            <a:extLst>
+              <a:ext uri="{FF2B5EF4-FFF2-40B4-BE49-F238E27FC236}">
+                <a16:creationId xmlns:a16="http://schemas.microsoft.com/office/drawing/2014/main" id="{A39E2A9C-3482-A735-F9D3-CCB37842F963}"/>
+              </a:ext>
+            </a:extLst>
+          </p:cNvPr>
+          <p:cNvSpPr txBox="1"/>
+          <p:nvPr/>
+        </p:nvSpPr>
+        <p:spPr>
+          <a:xfrm>
+            <a:off x="10147571" y="1357291"/>
+            <a:ext cx="1312711" cy="923330"/>
+          </a:xfrm>
+          <a:prstGeom prst="rect">
+            <a:avLst/>
+          </a:prstGeom>
+          <a:noFill/>
+        </p:spPr>
+        <p:txBody>
+          <a:bodyPr wrap="square" rtlCol="0">
+            <a:spAutoFit/>
+          </a:bodyPr>
+          <a:lstStyle/>
+          <a:p>
+            <a:r>
+              <a:rPr lang="en-US" u="sng" dirty="0">
+                <a:latin typeface="Courier New" panose="02070309020205020404" pitchFamily="49" charset="0"/>
+                <a:cs typeface="Courier New" panose="02070309020205020404" pitchFamily="49" charset="0"/>
+              </a:rPr>
+              <a:t>Console:</a:t>
+            </a:r>
+          </a:p>
+          <a:p>
+            <a:r>
+              <a:rPr lang="en-US" dirty="0">
+                <a:latin typeface="Courier New" panose="02070309020205020404" pitchFamily="49" charset="0"/>
+                <a:cs typeface="Courier New" panose="02070309020205020404" pitchFamily="49" charset="0"/>
+              </a:rPr>
+              <a:t>20</a:t>
+            </a:r>
+          </a:p>
+          <a:p>
+            <a:r>
+              <a:rPr lang="en-US" dirty="0">
+                <a:latin typeface="Courier New" panose="02070309020205020404" pitchFamily="49" charset="0"/>
+                <a:cs typeface="Courier New" panose="02070309020205020404" pitchFamily="49" charset="0"/>
+              </a:rPr>
+              <a:t>20</a:t>
+            </a:r>
+            <a:endParaRPr lang="ru-RU" dirty="0">
+              <a:latin typeface="Courier New" panose="02070309020205020404" pitchFamily="49" charset="0"/>
+              <a:cs typeface="Courier New" panose="02070309020205020404" pitchFamily="49" charset="0"/>
+            </a:endParaRPr>
+          </a:p>
+        </p:txBody>
+      </p:sp>
+    </p:spTree>
+    <p:extLst>
+      <p:ext uri="{BB962C8B-B14F-4D97-AF65-F5344CB8AC3E}">
+        <p14:creationId xmlns:p14="http://schemas.microsoft.com/office/powerpoint/2010/main" val="1160048001"/>
+      </p:ext>
+    </p:extLst>
+  </p:cSld>
+  <p:clrMapOvr>
+    <a:masterClrMapping/>
+  </p:clrMapOvr>
+</p:sld>
+</file>
+
+<file path=ppt/slides/slide11.xml><?xml version="1.0" encoding="utf-8"?>
+<p:sld xmlns:a="http://schemas.openxmlformats.org/drawingml/2006/main" xmlns:r="http://schemas.openxmlformats.org/officeDocument/2006/relationships" xmlns:p="http://schemas.openxmlformats.org/presentationml/2006/main">
+  <p:cSld>
+    <p:spTree>
+      <p:nvGrpSpPr>
+        <p:cNvPr id="1" name=""/>
+        <p:cNvGrpSpPr/>
+        <p:nvPr/>
+      </p:nvGrpSpPr>
+      <p:grpSpPr>
+        <a:xfrm>
+          <a:off x="0" y="0"/>
+          <a:ext cx="0" cy="0"/>
+          <a:chOff x="0" y="0"/>
+          <a:chExt cx="0" cy="0"/>
+        </a:xfrm>
+      </p:grpSpPr>
+      <p:sp>
+        <p:nvSpPr>
+          <p:cNvPr id="4" name="Заголовок 3">
+            <a:extLst>
+              <a:ext uri="{FF2B5EF4-FFF2-40B4-BE49-F238E27FC236}">
+                <a16:creationId xmlns:a16="http://schemas.microsoft.com/office/drawing/2014/main" id="{CE228031-626F-2E9C-A281-6879BD35A796}"/>
+              </a:ext>
+            </a:extLst>
+          </p:cNvPr>
+          <p:cNvSpPr>
+            <a:spLocks noGrp="1"/>
+          </p:cNvSpPr>
+          <p:nvPr>
+            <p:ph type="title"/>
+          </p:nvPr>
+        </p:nvSpPr>
+        <p:spPr/>
+        <p:txBody>
+          <a:bodyPr/>
+          <a:lstStyle/>
+          <a:p>
+            <a:r>
+              <a:rPr lang="ru-RU" dirty="0"/>
+              <a:t>Рекурсия</a:t>
+            </a:r>
+          </a:p>
+        </p:txBody>
+      </p:sp>
+      <p:sp>
+        <p:nvSpPr>
+          <p:cNvPr id="5" name="Объект 4">
+            <a:extLst>
+              <a:ext uri="{FF2B5EF4-FFF2-40B4-BE49-F238E27FC236}">
+                <a16:creationId xmlns:a16="http://schemas.microsoft.com/office/drawing/2014/main" id="{92B99C8A-AB97-793A-D096-FF305BB9F53D}"/>
+              </a:ext>
+            </a:extLst>
+          </p:cNvPr>
+          <p:cNvSpPr>
+            <a:spLocks noGrp="1"/>
+          </p:cNvSpPr>
+          <p:nvPr>
+            <p:ph idx="1"/>
+          </p:nvPr>
+        </p:nvSpPr>
+        <p:spPr>
+          <a:xfrm>
+            <a:off x="981075" y="1461544"/>
+            <a:ext cx="5410200" cy="4648994"/>
+          </a:xfrm>
+        </p:spPr>
+        <p:txBody>
+          <a:bodyPr>
+            <a:normAutofit/>
+          </a:bodyPr>
+          <a:lstStyle/>
+          <a:p>
+            <a:r>
+              <a:rPr lang="ru-RU" dirty="0"/>
+              <a:t>Рекурсия в </a:t>
+            </a:r>
+            <a:r>
+              <a:rPr lang="en-US" dirty="0"/>
+              <a:t>Rust</a:t>
+            </a:r>
+            <a:r>
+              <a:rPr lang="ru-RU" dirty="0"/>
+              <a:t> так же, как и в других в других ЯП</a:t>
+            </a:r>
+            <a:r>
+              <a:rPr lang="en-US" dirty="0"/>
+              <a:t>, </a:t>
+            </a:r>
+            <a:r>
+              <a:rPr lang="ru-RU" dirty="0"/>
+              <a:t>является функцией вызывающей саму себя.</a:t>
+            </a:r>
+            <a:endParaRPr lang="ru-RU" dirty="0">
+              <a:solidFill>
+                <a:schemeClr val="accent1"/>
+              </a:solidFill>
+            </a:endParaRPr>
+          </a:p>
+        </p:txBody>
+      </p:sp>
+      <p:pic>
+        <p:nvPicPr>
+          <p:cNvPr id="3" name="Рисунок 2">
+            <a:extLst>
+              <a:ext uri="{FF2B5EF4-FFF2-40B4-BE49-F238E27FC236}">
+                <a16:creationId xmlns:a16="http://schemas.microsoft.com/office/drawing/2014/main" id="{EF3FD7BF-811D-360D-E365-16B3FDC1AA38}"/>
+              </a:ext>
+            </a:extLst>
+          </p:cNvPr>
+          <p:cNvPicPr>
+            <a:picLocks noChangeAspect="1"/>
+          </p:cNvPicPr>
+          <p:nvPr/>
+        </p:nvPicPr>
+        <p:blipFill>
+          <a:blip r:embed="rId2"/>
+          <a:stretch>
+            <a:fillRect/>
+          </a:stretch>
+        </p:blipFill>
+        <p:spPr>
+          <a:xfrm>
+            <a:off x="6036178" y="1461544"/>
+            <a:ext cx="5890231" cy="4648994"/>
+          </a:xfrm>
+          <a:prstGeom prst="rect">
+            <a:avLst/>
+          </a:prstGeom>
+        </p:spPr>
+      </p:pic>
+      <p:sp>
+        <p:nvSpPr>
+          <p:cNvPr id="6" name="TextBox 5">
+            <a:extLst>
+              <a:ext uri="{FF2B5EF4-FFF2-40B4-BE49-F238E27FC236}">
+                <a16:creationId xmlns:a16="http://schemas.microsoft.com/office/drawing/2014/main" id="{EB95D8A3-901E-6C8B-F86E-FF8F54B25B6A}"/>
+              </a:ext>
+            </a:extLst>
+          </p:cNvPr>
+          <p:cNvSpPr txBox="1"/>
+          <p:nvPr/>
+        </p:nvSpPr>
+        <p:spPr>
+          <a:xfrm>
+            <a:off x="6036178" y="6110538"/>
+            <a:ext cx="3217547" cy="646331"/>
+          </a:xfrm>
+          <a:prstGeom prst="rect">
+            <a:avLst/>
+          </a:prstGeom>
+          <a:noFill/>
+        </p:spPr>
+        <p:txBody>
+          <a:bodyPr wrap="none" rtlCol="0">
+            <a:spAutoFit/>
+          </a:bodyPr>
+          <a:lstStyle/>
+          <a:p>
+            <a:r>
+              <a:rPr lang="en-US" b="1" u="sng" dirty="0">
+                <a:latin typeface="Courier New" panose="02070309020205020404" pitchFamily="49" charset="0"/>
+                <a:cs typeface="Courier New" panose="02070309020205020404" pitchFamily="49" charset="0"/>
+              </a:rPr>
+              <a:t>Console:</a:t>
+            </a:r>
+          </a:p>
+          <a:p>
+            <a:r>
+              <a:rPr lang="en-US" dirty="0">
+                <a:latin typeface="Courier New" panose="02070309020205020404" pitchFamily="49" charset="0"/>
+                <a:cs typeface="Courier New" panose="02070309020205020404" pitchFamily="49" charset="0"/>
+              </a:rPr>
+              <a:t>Factorial of 5 is: 120</a:t>
+            </a:r>
+            <a:endParaRPr lang="ru-RU" dirty="0">
+              <a:latin typeface="Courier New" panose="02070309020205020404" pitchFamily="49" charset="0"/>
+              <a:cs typeface="Courier New" panose="02070309020205020404" pitchFamily="49" charset="0"/>
+            </a:endParaRPr>
+          </a:p>
+        </p:txBody>
+      </p:sp>
+    </p:spTree>
+    <p:extLst>
+      <p:ext uri="{BB962C8B-B14F-4D97-AF65-F5344CB8AC3E}">
+        <p14:creationId xmlns:p14="http://schemas.microsoft.com/office/powerpoint/2010/main" val="4048630401"/>
+      </p:ext>
+    </p:extLst>
+  </p:cSld>
+  <p:clrMapOvr>
+    <a:masterClrMapping/>
+  </p:clrMapOvr>
+</p:sld>
+</file>
+
+<file path=ppt/slides/slide12.xml><?xml version="1.0" encoding="utf-8"?>
+<p:sld xmlns:a="http://schemas.openxmlformats.org/drawingml/2006/main" xmlns:r="http://schemas.openxmlformats.org/officeDocument/2006/relationships" xmlns:p="http://schemas.openxmlformats.org/presentationml/2006/main">
+  <p:cSld>
+    <p:spTree>
+      <p:nvGrpSpPr>
+        <p:cNvPr id="1" name=""/>
+        <p:cNvGrpSpPr/>
+        <p:nvPr/>
+      </p:nvGrpSpPr>
+      <p:grpSpPr>
+        <a:xfrm>
+          <a:off x="0" y="0"/>
+          <a:ext cx="0" cy="0"/>
+          <a:chOff x="0" y="0"/>
+          <a:chExt cx="0" cy="0"/>
+        </a:xfrm>
+      </p:grpSpPr>
+      <p:sp>
+        <p:nvSpPr>
+          <p:cNvPr id="4" name="Заголовок 3">
+            <a:extLst>
+              <a:ext uri="{FF2B5EF4-FFF2-40B4-BE49-F238E27FC236}">
+                <a16:creationId xmlns:a16="http://schemas.microsoft.com/office/drawing/2014/main" id="{CE228031-626F-2E9C-A281-6879BD35A796}"/>
+              </a:ext>
+            </a:extLst>
+          </p:cNvPr>
+          <p:cNvSpPr>
+            <a:spLocks noGrp="1"/>
+          </p:cNvSpPr>
+          <p:nvPr>
+            <p:ph type="title"/>
+          </p:nvPr>
+        </p:nvSpPr>
+        <p:spPr/>
+        <p:txBody>
+          <a:bodyPr/>
+          <a:lstStyle/>
+          <a:p>
+            <a:r>
+              <a:rPr lang="ru-RU" dirty="0"/>
+              <a:t>Замыкания</a:t>
+            </a:r>
+          </a:p>
+        </p:txBody>
+      </p:sp>
+      <p:sp>
+        <p:nvSpPr>
+          <p:cNvPr id="5" name="Объект 4">
+            <a:extLst>
+              <a:ext uri="{FF2B5EF4-FFF2-40B4-BE49-F238E27FC236}">
+                <a16:creationId xmlns:a16="http://schemas.microsoft.com/office/drawing/2014/main" id="{92B99C8A-AB97-793A-D096-FF305BB9F53D}"/>
+              </a:ext>
+            </a:extLst>
+          </p:cNvPr>
+          <p:cNvSpPr>
+            <a:spLocks noGrp="1"/>
+          </p:cNvSpPr>
+          <p:nvPr>
+            <p:ph idx="1"/>
+          </p:nvPr>
+        </p:nvSpPr>
+        <p:spPr>
+          <a:xfrm>
+            <a:off x="838200" y="1620165"/>
+            <a:ext cx="5338665" cy="4648994"/>
+          </a:xfrm>
+        </p:spPr>
+        <p:txBody>
+          <a:bodyPr>
+            <a:normAutofit fontScale="92500"/>
+          </a:bodyPr>
+          <a:lstStyle/>
+          <a:p>
+            <a:r>
+              <a:rPr lang="ru-RU" dirty="0"/>
+              <a:t>Анонимные функции, которые могут захватывать переменные</a:t>
+            </a:r>
+          </a:p>
+          <a:p>
+            <a:r>
+              <a:rPr lang="ru-RU" dirty="0">
+                <a:solidFill>
+                  <a:schemeClr val="accent1"/>
+                </a:solidFill>
+              </a:rPr>
+              <a:t>В отличие от функции</a:t>
+            </a:r>
+            <a:r>
+              <a:rPr lang="ru-RU" dirty="0"/>
+              <a:t>: тип входных и выходных данных указывать </a:t>
+            </a:r>
+            <a:r>
+              <a:rPr lang="ru-RU" u="sng" dirty="0"/>
+              <a:t>необязательно</a:t>
+            </a:r>
+            <a:r>
+              <a:rPr lang="ru-RU" dirty="0"/>
+              <a:t>, а название аргумента </a:t>
+            </a:r>
+            <a:r>
+              <a:rPr lang="ru-RU" u="sng" dirty="0"/>
+              <a:t>обязательно.</a:t>
+            </a:r>
+          </a:p>
+          <a:p>
+            <a:r>
+              <a:rPr lang="ru-RU" dirty="0"/>
+              <a:t>Используется </a:t>
+            </a:r>
+            <a:r>
+              <a:rPr lang="en-US" dirty="0">
+                <a:solidFill>
+                  <a:schemeClr val="accent1"/>
+                </a:solidFill>
+              </a:rPr>
+              <a:t>||</a:t>
+            </a:r>
+            <a:r>
+              <a:rPr lang="ru-RU" dirty="0">
+                <a:solidFill>
+                  <a:schemeClr val="accent1"/>
+                </a:solidFill>
+              </a:rPr>
+              <a:t> </a:t>
+            </a:r>
+            <a:r>
+              <a:rPr lang="ru-RU" dirty="0"/>
+              <a:t>вместо</a:t>
+            </a:r>
+            <a:r>
+              <a:rPr lang="ru-RU" dirty="0">
+                <a:solidFill>
+                  <a:schemeClr val="accent1"/>
+                </a:solidFill>
+              </a:rPr>
+              <a:t>  ()</a:t>
+            </a:r>
+          </a:p>
+          <a:p>
+            <a:r>
+              <a:rPr lang="ru-RU" dirty="0"/>
+              <a:t>Ограничение тела функции </a:t>
+            </a:r>
+            <a:r>
+              <a:rPr lang="en-US" dirty="0">
+                <a:solidFill>
+                  <a:schemeClr val="accent1"/>
+                </a:solidFill>
+              </a:rPr>
+              <a:t>{}</a:t>
+            </a:r>
+            <a:r>
+              <a:rPr lang="ru-RU" dirty="0">
+                <a:solidFill>
+                  <a:schemeClr val="accent1"/>
+                </a:solidFill>
+              </a:rPr>
+              <a:t> - опционально</a:t>
+            </a:r>
+            <a:endParaRPr lang="en-US" dirty="0">
+              <a:solidFill>
+                <a:schemeClr val="accent1"/>
+              </a:solidFill>
+            </a:endParaRPr>
+          </a:p>
+          <a:p>
+            <a:r>
+              <a:rPr lang="ru-RU" dirty="0"/>
+              <a:t>Захват переменных за пределами окружения</a:t>
+            </a:r>
+          </a:p>
+        </p:txBody>
+      </p:sp>
+      <p:pic>
+        <p:nvPicPr>
+          <p:cNvPr id="3" name="Рисунок 2">
+            <a:extLst>
+              <a:ext uri="{FF2B5EF4-FFF2-40B4-BE49-F238E27FC236}">
+                <a16:creationId xmlns:a16="http://schemas.microsoft.com/office/drawing/2014/main" id="{563C0972-A33A-C62C-BF2E-315C5CAC1B01}"/>
+              </a:ext>
+            </a:extLst>
+          </p:cNvPr>
+          <p:cNvPicPr>
+            <a:picLocks noChangeAspect="1"/>
+          </p:cNvPicPr>
+          <p:nvPr/>
+        </p:nvPicPr>
+        <p:blipFill>
+          <a:blip r:embed="rId2"/>
+          <a:stretch>
+            <a:fillRect/>
+          </a:stretch>
+        </p:blipFill>
+        <p:spPr>
+          <a:xfrm>
+            <a:off x="6561221" y="204704"/>
+            <a:ext cx="5503545" cy="5169401"/>
+          </a:xfrm>
+          <a:prstGeom prst="rect">
+            <a:avLst/>
+          </a:prstGeom>
+        </p:spPr>
+      </p:pic>
+      <p:sp>
+        <p:nvSpPr>
+          <p:cNvPr id="6" name="TextBox 5">
+            <a:extLst>
+              <a:ext uri="{FF2B5EF4-FFF2-40B4-BE49-F238E27FC236}">
+                <a16:creationId xmlns:a16="http://schemas.microsoft.com/office/drawing/2014/main" id="{A06F22AA-16A3-9E9C-D7C9-89ECA5B31594}"/>
+              </a:ext>
+            </a:extLst>
+          </p:cNvPr>
+          <p:cNvSpPr txBox="1"/>
+          <p:nvPr/>
+        </p:nvSpPr>
+        <p:spPr>
+          <a:xfrm>
+            <a:off x="6561221" y="5447348"/>
+            <a:ext cx="4458272" cy="1477328"/>
+          </a:xfrm>
+          <a:prstGeom prst="rect">
+            <a:avLst/>
+          </a:prstGeom>
+          <a:noFill/>
+        </p:spPr>
+        <p:txBody>
+          <a:bodyPr wrap="none" rtlCol="0">
+            <a:spAutoFit/>
+          </a:bodyPr>
+          <a:lstStyle/>
+          <a:p>
+            <a:r>
+              <a:rPr lang="en-US" b="1" u="sng" dirty="0">
+                <a:latin typeface="Courier New" panose="02070309020205020404" pitchFamily="49" charset="0"/>
+                <a:cs typeface="Courier New" panose="02070309020205020404" pitchFamily="49" charset="0"/>
+              </a:rPr>
+              <a:t>Console:</a:t>
+            </a:r>
+          </a:p>
+          <a:p>
+            <a:r>
+              <a:rPr lang="en-US" dirty="0">
+                <a:latin typeface="Courier New" panose="02070309020205020404" pitchFamily="49" charset="0"/>
+                <a:cs typeface="Courier New" panose="02070309020205020404" pitchFamily="49" charset="0"/>
+              </a:rPr>
+              <a:t>Function: 2</a:t>
+            </a:r>
+          </a:p>
+          <a:p>
+            <a:r>
+              <a:rPr lang="en-US" dirty="0">
+                <a:latin typeface="Courier New" panose="02070309020205020404" pitchFamily="49" charset="0"/>
+                <a:cs typeface="Courier New" panose="02070309020205020404" pitchFamily="49" charset="0"/>
+              </a:rPr>
+              <a:t>Closure with type indication: 2</a:t>
+            </a:r>
+          </a:p>
+          <a:p>
+            <a:r>
+              <a:rPr lang="en-US" dirty="0">
+                <a:latin typeface="Courier New" panose="02070309020205020404" pitchFamily="49" charset="0"/>
+                <a:cs typeface="Courier New" panose="02070309020205020404" pitchFamily="49" charset="0"/>
+              </a:rPr>
+              <a:t>Closure with type output: 2</a:t>
+            </a:r>
+          </a:p>
+          <a:p>
+            <a:r>
+              <a:rPr lang="en-US" dirty="0">
+                <a:latin typeface="Courier New" panose="02070309020205020404" pitchFamily="49" charset="0"/>
+                <a:cs typeface="Courier New" panose="02070309020205020404" pitchFamily="49" charset="0"/>
+              </a:rPr>
+              <a:t>Closure returning one: 1</a:t>
+            </a:r>
+            <a:endParaRPr lang="ru-RU" dirty="0">
+              <a:latin typeface="Courier New" panose="02070309020205020404" pitchFamily="49" charset="0"/>
+              <a:cs typeface="Courier New" panose="02070309020205020404" pitchFamily="49" charset="0"/>
+            </a:endParaRPr>
+          </a:p>
+        </p:txBody>
+      </p:sp>
+    </p:spTree>
+    <p:extLst>
+      <p:ext uri="{BB962C8B-B14F-4D97-AF65-F5344CB8AC3E}">
+        <p14:creationId xmlns:p14="http://schemas.microsoft.com/office/powerpoint/2010/main" val="4276738133"/>
+      </p:ext>
+    </p:extLst>
+  </p:cSld>
+  <p:clrMapOvr>
+    <a:masterClrMapping/>
+  </p:clrMapOvr>
+</p:sld>
+</file>
+
+<file path=ppt/slides/slide13.xml><?xml version="1.0" encoding="utf-8"?>
+<p:sld xmlns:a="http://schemas.openxmlformats.org/drawingml/2006/main" xmlns:r="http://schemas.openxmlformats.org/officeDocument/2006/relationships" xmlns:p="http://schemas.openxmlformats.org/presentationml/2006/main">
+  <p:cSld>
+    <p:spTree>
+      <p:nvGrpSpPr>
+        <p:cNvPr id="1" name=""/>
+        <p:cNvGrpSpPr/>
+        <p:nvPr/>
+      </p:nvGrpSpPr>
+      <p:grpSpPr>
+        <a:xfrm>
+          <a:off x="0" y="0"/>
+          <a:ext cx="0" cy="0"/>
+          <a:chOff x="0" y="0"/>
+          <a:chExt cx="0" cy="0"/>
+        </a:xfrm>
+      </p:grpSpPr>
+      <p:sp>
+        <p:nvSpPr>
+          <p:cNvPr id="4" name="Заголовок 3">
+            <a:extLst>
+              <a:ext uri="{FF2B5EF4-FFF2-40B4-BE49-F238E27FC236}">
+                <a16:creationId xmlns:a16="http://schemas.microsoft.com/office/drawing/2014/main" id="{CE228031-626F-2E9C-A281-6879BD35A796}"/>
+              </a:ext>
+            </a:extLst>
+          </p:cNvPr>
+          <p:cNvSpPr>
+            <a:spLocks noGrp="1"/>
+          </p:cNvSpPr>
+          <p:nvPr>
+            <p:ph type="title"/>
+          </p:nvPr>
+        </p:nvSpPr>
+        <p:spPr/>
+        <p:txBody>
+          <a:bodyPr/>
+          <a:lstStyle/>
+          <a:p>
+            <a:r>
+              <a:rPr lang="ru-RU" dirty="0"/>
+              <a:t>Расходящиеся функции</a:t>
+            </a:r>
+          </a:p>
+        </p:txBody>
+      </p:sp>
+      <p:sp>
+        <p:nvSpPr>
+          <p:cNvPr id="5" name="Объект 4">
+            <a:extLst>
+              <a:ext uri="{FF2B5EF4-FFF2-40B4-BE49-F238E27FC236}">
+                <a16:creationId xmlns:a16="http://schemas.microsoft.com/office/drawing/2014/main" id="{92B99C8A-AB97-793A-D096-FF305BB9F53D}"/>
+              </a:ext>
+            </a:extLst>
+          </p:cNvPr>
+          <p:cNvSpPr>
+            <a:spLocks noGrp="1"/>
+          </p:cNvSpPr>
+          <p:nvPr>
+            <p:ph idx="1"/>
+          </p:nvPr>
+        </p:nvSpPr>
+        <p:spPr>
+          <a:xfrm>
+            <a:off x="838200" y="1620165"/>
+            <a:ext cx="5410200" cy="4648994"/>
+          </a:xfrm>
+        </p:spPr>
+        <p:txBody>
+          <a:bodyPr>
+            <a:normAutofit/>
+          </a:bodyPr>
+          <a:lstStyle/>
+          <a:p>
+            <a:r>
+              <a:rPr lang="ru-RU" dirty="0"/>
+              <a:t>Никогда не возвращают результат</a:t>
+            </a:r>
+          </a:p>
+          <a:p>
+            <a:r>
+              <a:rPr lang="ru-RU" dirty="0"/>
+              <a:t>Помечены </a:t>
+            </a:r>
+            <a:r>
+              <a:rPr lang="en-US" b="1" dirty="0">
+                <a:solidFill>
+                  <a:schemeClr val="accent1"/>
+                </a:solidFill>
+              </a:rPr>
+              <a:t>!</a:t>
+            </a:r>
+            <a:r>
+              <a:rPr lang="ru-RU" dirty="0">
+                <a:solidFill>
+                  <a:schemeClr val="accent1"/>
+                </a:solidFill>
+              </a:rPr>
+              <a:t> </a:t>
+            </a:r>
+            <a:r>
+              <a:rPr lang="en-US" dirty="0"/>
+              <a:t>, </a:t>
+            </a:r>
+            <a:r>
+              <a:rPr lang="ru-RU" dirty="0"/>
+              <a:t>который является пустым типом</a:t>
+            </a:r>
+          </a:p>
+          <a:p>
+            <a:r>
+              <a:rPr lang="ru-RU" dirty="0"/>
+              <a:t>По сравнению с другими типами создан быть не может – набор всех возможных значений пуст</a:t>
+            </a:r>
+          </a:p>
+          <a:p>
+            <a:r>
+              <a:rPr lang="ru-RU" dirty="0"/>
+              <a:t>Отличие от </a:t>
+            </a:r>
+            <a:r>
+              <a:rPr lang="ru-RU" b="1" dirty="0">
+                <a:solidFill>
+                  <a:schemeClr val="accent1"/>
+                </a:solidFill>
+              </a:rPr>
+              <a:t>() </a:t>
+            </a:r>
+            <a:r>
+              <a:rPr lang="ru-RU" dirty="0"/>
+              <a:t>– </a:t>
+            </a:r>
+            <a:r>
+              <a:rPr lang="en-US" dirty="0"/>
+              <a:t>unit </a:t>
+            </a:r>
+            <a:r>
+              <a:rPr lang="ru-RU" dirty="0"/>
+              <a:t>имеет ровно 1 возможное значение</a:t>
+            </a:r>
+          </a:p>
+        </p:txBody>
+      </p:sp>
+    </p:spTree>
+    <p:extLst>
+      <p:ext uri="{BB962C8B-B14F-4D97-AF65-F5344CB8AC3E}">
+        <p14:creationId xmlns:p14="http://schemas.microsoft.com/office/powerpoint/2010/main" val="3227350247"/>
+      </p:ext>
+    </p:extLst>
+  </p:cSld>
+  <p:clrMapOvr>
+    <a:masterClrMapping/>
+  </p:clrMapOvr>
+</p:sld>
+</file>
+
+<file path=ppt/slides/slide14.xml><?xml version="1.0" encoding="utf-8"?>
+<p:sld xmlns:a="http://schemas.openxmlformats.org/drawingml/2006/main" xmlns:r="http://schemas.openxmlformats.org/officeDocument/2006/relationships" xmlns:p="http://schemas.openxmlformats.org/presentationml/2006/main">
+  <p:cSld>
+    <p:spTree>
+      <p:nvGrpSpPr>
+        <p:cNvPr id="1" name=""/>
+        <p:cNvGrpSpPr/>
+        <p:nvPr/>
+      </p:nvGrpSpPr>
+      <p:grpSpPr>
+        <a:xfrm>
+          <a:off x="0" y="0"/>
+          <a:ext cx="0" cy="0"/>
+          <a:chOff x="0" y="0"/>
+          <a:chExt cx="0" cy="0"/>
+        </a:xfrm>
+      </p:grpSpPr>
+      <p:sp>
+        <p:nvSpPr>
+          <p:cNvPr id="2" name="Заголовок 1">
+            <a:extLst>
+              <a:ext uri="{FF2B5EF4-FFF2-40B4-BE49-F238E27FC236}">
+                <a16:creationId xmlns:a16="http://schemas.microsoft.com/office/drawing/2014/main" id="{3B020788-B501-7844-AD7D-77D64EB0C490}"/>
+              </a:ext>
+            </a:extLst>
+          </p:cNvPr>
+          <p:cNvSpPr>
+            <a:spLocks noGrp="1"/>
+          </p:cNvSpPr>
+          <p:nvPr>
+            <p:ph type="title"/>
+          </p:nvPr>
+        </p:nvSpPr>
+        <p:spPr/>
+        <p:txBody>
+          <a:bodyPr/>
+          <a:lstStyle/>
+          <a:p>
+            <a:r>
+              <a:rPr lang="ru-RU" dirty="0"/>
+              <a:t>Материалы</a:t>
+            </a:r>
+          </a:p>
+        </p:txBody>
+      </p:sp>
+      <p:sp>
+        <p:nvSpPr>
+          <p:cNvPr id="3" name="Объект 2">
+            <a:extLst>
+              <a:ext uri="{FF2B5EF4-FFF2-40B4-BE49-F238E27FC236}">
+                <a16:creationId xmlns:a16="http://schemas.microsoft.com/office/drawing/2014/main" id="{BB394B4C-631A-B81B-D635-9053F4A2107D}"/>
+              </a:ext>
+            </a:extLst>
+          </p:cNvPr>
+          <p:cNvSpPr>
+            <a:spLocks noGrp="1"/>
+          </p:cNvSpPr>
+          <p:nvPr>
+            <p:ph idx="1"/>
+          </p:nvPr>
+        </p:nvSpPr>
+        <p:spPr/>
+        <p:txBody>
+          <a:bodyPr/>
+          <a:lstStyle/>
+          <a:p>
+            <a:r>
+              <a:rPr lang="ru-RU" dirty="0"/>
+              <a:t>Официальная документация </a:t>
+            </a:r>
+            <a:r>
+              <a:rPr lang="en-US" dirty="0"/>
+              <a:t>Rust(en, ru)</a:t>
+            </a:r>
+          </a:p>
+          <a:p>
+            <a:pPr lvl="1"/>
+            <a:r>
+              <a:rPr lang="en-US" dirty="0">
+                <a:hlinkClick r:id="rId2"/>
+              </a:rPr>
+              <a:t>https://doc.rust-lang.org/book/ch03-03-how-functions-work.html</a:t>
+            </a:r>
+            <a:endParaRPr lang="en-US" dirty="0"/>
+          </a:p>
+          <a:p>
+            <a:pPr lvl="1"/>
+            <a:r>
+              <a:rPr lang="en-US" dirty="0">
+                <a:hlinkClick r:id="rId3"/>
+              </a:rPr>
+              <a:t>https://doc.rust-lang.ru/stable/rust-by-example/fn.html</a:t>
+            </a:r>
+            <a:endParaRPr lang="en-US" dirty="0"/>
+          </a:p>
+          <a:p>
+            <a:pPr lvl="1"/>
+            <a:r>
+              <a:rPr lang="en-US" dirty="0">
+                <a:hlinkClick r:id="rId4"/>
+              </a:rPr>
+              <a:t>https://doc.rust-lang.ru/stable/rust-by-example/expression.html</a:t>
+            </a:r>
+            <a:endParaRPr lang="ru-RU" dirty="0"/>
+          </a:p>
+          <a:p>
+            <a:r>
+              <a:rPr lang="ru-RU" dirty="0"/>
+              <a:t>Программирование на языке </a:t>
+            </a:r>
+            <a:r>
+              <a:rPr lang="en-US" dirty="0"/>
+              <a:t>Rust</a:t>
+            </a:r>
+            <a:endParaRPr lang="ru-RU" dirty="0"/>
+          </a:p>
+          <a:p>
+            <a:pPr lvl="1"/>
+            <a:r>
+              <a:rPr lang="en-US" dirty="0">
+                <a:hlinkClick r:id="rId5"/>
+              </a:rPr>
+              <a:t>https://vk.com/topic-51126445_36552642</a:t>
+            </a:r>
+            <a:endParaRPr lang="en-US" dirty="0"/>
+          </a:p>
+        </p:txBody>
+      </p:sp>
+    </p:spTree>
+    <p:extLst>
+      <p:ext uri="{BB962C8B-B14F-4D97-AF65-F5344CB8AC3E}">
+        <p14:creationId xmlns:p14="http://schemas.microsoft.com/office/powerpoint/2010/main" val="3793044585"/>
+      </p:ext>
+    </p:extLst>
+  </p:cSld>
+  <p:clrMapOvr>
+    <a:masterClrMapping/>
+  </p:clrMapOvr>
+</p:sld>
+</file>
+
+<file path=ppt/slides/slide15.xml><?xml version="1.0" encoding="utf-8"?>
+<p:sld xmlns:a="http://schemas.openxmlformats.org/drawingml/2006/main" xmlns:r="http://schemas.openxmlformats.org/officeDocument/2006/relationships" xmlns:p="http://schemas.openxmlformats.org/presentationml/2006/main">
+  <p:cSld>
+    <p:spTree>
+      <p:nvGrpSpPr>
+        <p:cNvPr id="1" name=""/>
+        <p:cNvGrpSpPr/>
+        <p:nvPr/>
+      </p:nvGrpSpPr>
+      <p:grpSpPr>
+        <a:xfrm>
+          <a:off x="0" y="0"/>
+          <a:ext cx="0" cy="0"/>
+          <a:chOff x="0" y="0"/>
+          <a:chExt cx="0" cy="0"/>
+        </a:xfrm>
+      </p:grpSpPr>
+      <p:sp>
+        <p:nvSpPr>
+          <p:cNvPr id="4" name="Заголовок 3">
+            <a:extLst>
+              <a:ext uri="{FF2B5EF4-FFF2-40B4-BE49-F238E27FC236}">
+                <a16:creationId xmlns:a16="http://schemas.microsoft.com/office/drawing/2014/main" id="{EBE47465-5303-012E-C087-D118187C7970}"/>
+              </a:ext>
+            </a:extLst>
+          </p:cNvPr>
+          <p:cNvSpPr>
+            <a:spLocks noGrp="1"/>
+          </p:cNvSpPr>
+          <p:nvPr>
+            <p:ph type="title"/>
+          </p:nvPr>
+        </p:nvSpPr>
+        <p:spPr>
+          <a:xfrm>
+            <a:off x="838200" y="341312"/>
+            <a:ext cx="10515600" cy="1325563"/>
+          </a:xfrm>
+        </p:spPr>
+        <p:txBody>
+          <a:bodyPr>
+            <a:normAutofit/>
+          </a:bodyPr>
+          <a:lstStyle/>
+          <a:p>
+            <a:pPr algn="ctr"/>
+            <a:r>
+              <a:rPr lang="ru-RU" sz="6000"/>
+              <a:t>Спасибо за внимание!</a:t>
+            </a:r>
+            <a:endParaRPr lang="ru-RU" sz="6000" dirty="0"/>
+          </a:p>
+        </p:txBody>
+      </p:sp>
+      <p:pic>
+        <p:nvPicPr>
+          <p:cNvPr id="5" name="Рисунок 4" descr="Изображение выглядит как текст, мультфильм, Мультфильм, снимок экрана&#10;&#10;Автоматически созданное описание">
+            <a:extLst>
+              <a:ext uri="{FF2B5EF4-FFF2-40B4-BE49-F238E27FC236}">
+                <a16:creationId xmlns:a16="http://schemas.microsoft.com/office/drawing/2014/main" id="{40D5377D-8B61-46EC-E60D-7BDC41D52DEA}"/>
+              </a:ext>
+            </a:extLst>
+          </p:cNvPr>
+          <p:cNvPicPr>
+            <a:picLocks noChangeAspect="1"/>
+          </p:cNvPicPr>
+          <p:nvPr/>
+        </p:nvPicPr>
+        <p:blipFill>
+          <a:blip r:embed="rId2">
+            <a:extLst>
+              <a:ext uri="{28A0092B-C50C-407E-A947-70E740481C1C}">
+                <a14:useLocalDpi xmlns:a14="http://schemas.microsoft.com/office/drawing/2010/main" val="0"/>
+              </a:ext>
+            </a:extLst>
+          </a:blip>
+          <a:stretch>
+            <a:fillRect/>
+          </a:stretch>
+        </p:blipFill>
+        <p:spPr>
+          <a:xfrm>
+            <a:off x="2616993" y="1495425"/>
+            <a:ext cx="6958013" cy="5218510"/>
+          </a:xfrm>
+          <a:prstGeom prst="rect">
+            <a:avLst/>
+          </a:prstGeom>
+        </p:spPr>
+      </p:pic>
+    </p:spTree>
+    <p:extLst>
+      <p:ext uri="{BB962C8B-B14F-4D97-AF65-F5344CB8AC3E}">
+        <p14:creationId xmlns:p14="http://schemas.microsoft.com/office/powerpoint/2010/main" val="2260275669"/>
+      </p:ext>
+    </p:extLst>
+  </p:cSld>
+  <p:clrMapOvr>
+    <a:masterClrMapping/>
+  </p:clrMapOvr>
+</p:sld>
+</file>
+
 <file path=ppt/slides/slide2.xml><?xml version="1.0" encoding="utf-8"?>
 <p:sld xmlns:a="http://schemas.openxmlformats.org/drawingml/2006/main" xmlns:r="http://schemas.openxmlformats.org/officeDocument/2006/relationships" xmlns:p="http://schemas.openxmlformats.org/presentationml/2006/main">
   <p:cSld>
@@ -3450,8 +4575,13 @@
           <a:p>
             <a:r>
               <a:rPr lang="ru-RU" dirty="0"/>
-              <a:t>Введение</a:t>
-            </a:r>
+              <a:t>Операторы и выражения</a:t>
+            </a:r>
+            <a:r>
+              <a:rPr lang="en-US" dirty="0"/>
+              <a:t> (1/2)</a:t>
+            </a:r>
+            <a:endParaRPr lang="ru-RU" dirty="0"/>
           </a:p>
         </p:txBody>
       </p:sp>
@@ -3473,125 +4603,106 @@
         </p:nvSpPr>
         <p:spPr>
           <a:xfrm>
-            <a:off x="981075" y="1285081"/>
-            <a:ext cx="5410200" cy="4648994"/>
+            <a:off x="838200" y="1503734"/>
+            <a:ext cx="7839270" cy="2651839"/>
           </a:xfrm>
         </p:spPr>
         <p:txBody>
           <a:bodyPr>
-            <a:normAutofit fontScale="92500" lnSpcReduction="10000"/>
+            <a:normAutofit fontScale="92500"/>
           </a:bodyPr>
           <a:lstStyle/>
           <a:p>
             <a:r>
               <a:rPr lang="ru-RU" dirty="0"/>
-              <a:t>Функции в </a:t>
-            </a:r>
-            <a:r>
-              <a:rPr lang="en-US" dirty="0"/>
-              <a:t>Rust </a:t>
-            </a:r>
-            <a:r>
-              <a:rPr lang="ru-RU" dirty="0"/>
-              <a:t>определяются с помощью ключевого слова </a:t>
-            </a:r>
-            <a:r>
-              <a:rPr lang="en-US" b="1" dirty="0" err="1">
+              <a:t>Тело функции состоит из серии операторов, которые могут заканчиваться выражением.</a:t>
+            </a:r>
+          </a:p>
+          <a:p>
+            <a:r>
+              <a:rPr lang="ru-RU" dirty="0">
                 <a:solidFill>
                   <a:schemeClr val="accent1"/>
                 </a:solidFill>
-                <a:latin typeface="Courier New" panose="02070309020205020404" pitchFamily="49" charset="0"/>
-                <a:cs typeface="Courier New" panose="02070309020205020404" pitchFamily="49" charset="0"/>
               </a:rPr>
-              <a:t>fn</a:t>
-            </a:r>
-            <a:r>
-              <a:rPr lang="en-US" dirty="0"/>
-              <a:t>, </a:t>
-            </a:r>
-            <a:r>
-              <a:rPr lang="ru-RU" dirty="0"/>
-              <a:t>за которым следуют имя функции, параметры и тип возвращаемого значения</a:t>
-            </a:r>
-            <a:r>
-              <a:rPr lang="en-US" dirty="0"/>
-              <a:t>.</a:t>
-            </a:r>
-          </a:p>
-          <a:p>
-            <a:r>
-              <a:rPr lang="ru-RU" dirty="0"/>
-              <a:t>Точка входа в программу</a:t>
-            </a:r>
-            <a:r>
-              <a:rPr lang="en-US" dirty="0"/>
-              <a:t>: </a:t>
-            </a:r>
-            <a:r>
-              <a:rPr lang="en-US" b="1" dirty="0">
+              <a:t>Оператор(</a:t>
+            </a:r>
+            <a:r>
+              <a:rPr lang="en-US" dirty="0">
                 <a:solidFill>
                   <a:schemeClr val="accent1"/>
                 </a:solidFill>
-                <a:latin typeface="Courier New" panose="02070309020205020404" pitchFamily="49" charset="0"/>
-                <a:cs typeface="Courier New" panose="02070309020205020404" pitchFamily="49" charset="0"/>
               </a:rPr>
-              <a:t>main</a:t>
-            </a:r>
-          </a:p>
-          <a:p>
-            <a:r>
-              <a:rPr lang="ru-RU" dirty="0"/>
-              <a:t>По умолчанию используется </a:t>
-            </a:r>
-            <a:r>
-              <a:rPr lang="en-US" b="1" dirty="0">
+              <a:t>statement) - </a:t>
+            </a:r>
+            <a:r>
+              <a:rPr lang="ru-RU" dirty="0"/>
+              <a:t>инструкция, которая выполняет действие и ничего не возвращают</a:t>
+            </a:r>
+            <a:r>
+              <a:rPr lang="en-US" dirty="0"/>
+              <a:t>.</a:t>
+            </a:r>
+            <a:r>
+              <a:rPr lang="ru-RU" dirty="0"/>
+              <a:t> Заканчиваются</a:t>
+            </a:r>
+            <a:r>
+              <a:rPr lang="en-US" dirty="0"/>
+              <a:t> (</a:t>
+            </a:r>
+            <a:r>
+              <a:rPr lang="ru-RU" dirty="0"/>
+              <a:t> </a:t>
+            </a:r>
+            <a:r>
+              <a:rPr lang="en-US" dirty="0">
                 <a:solidFill>
                   <a:schemeClr val="accent1"/>
                 </a:solidFill>
-                <a:latin typeface="Courier New" panose="02070309020205020404" pitchFamily="49" charset="0"/>
-                <a:cs typeface="Courier New" panose="02070309020205020404" pitchFamily="49" charset="0"/>
               </a:rPr>
-              <a:t>snake case</a:t>
-            </a:r>
-          </a:p>
-          <a:p>
-            <a:r>
-              <a:rPr lang="ru-RU" u="sng" dirty="0"/>
-              <a:t>Не важно где определяются </a:t>
-            </a:r>
-            <a:r>
-              <a:rPr lang="ru-RU" dirty="0"/>
-              <a:t>функции</a:t>
+              <a:t>; </a:t>
             </a:r>
             <a:r>
               <a:rPr lang="en-US" dirty="0"/>
-              <a:t>; </a:t>
-            </a:r>
-            <a:r>
-              <a:rPr lang="ru-RU" u="sng" dirty="0"/>
-              <a:t>важно</a:t>
-            </a:r>
-            <a:r>
-              <a:rPr lang="ru-RU" dirty="0"/>
-              <a:t>, чтобы они были определены </a:t>
-            </a:r>
-            <a:r>
-              <a:rPr lang="ru-RU" u="sng" dirty="0"/>
-              <a:t>в области видимости</a:t>
-            </a:r>
-            <a:r>
-              <a:rPr lang="ru-RU" dirty="0"/>
-              <a:t>, которую может видеть вызывающей процедуры.</a:t>
+              <a:t>)</a:t>
+            </a:r>
+            <a:endParaRPr lang="ru-RU" dirty="0"/>
+          </a:p>
+          <a:p>
+            <a:r>
+              <a:rPr lang="ru-RU" dirty="0">
+                <a:solidFill>
+                  <a:schemeClr val="accent1"/>
+                </a:solidFill>
+              </a:rPr>
+              <a:t>Выражения</a:t>
+            </a:r>
+            <a:r>
+              <a:rPr lang="en-US" dirty="0">
+                <a:solidFill>
+                  <a:schemeClr val="accent1"/>
+                </a:solidFill>
+              </a:rPr>
+              <a:t>(expression)</a:t>
+            </a:r>
+            <a:r>
+              <a:rPr lang="ru-RU" dirty="0"/>
+              <a:t> – результирующее значение</a:t>
+            </a:r>
+            <a:r>
+              <a:rPr lang="en-US" dirty="0"/>
+              <a:t>.</a:t>
             </a:r>
           </a:p>
         </p:txBody>
       </p:sp>
       <p:pic>
         <p:nvPicPr>
-          <p:cNvPr id="11" name="Рисунок 10">
-            <a:extLst>
-              <a:ext uri="{FF2B5EF4-FFF2-40B4-BE49-F238E27FC236}">
-                <a16:creationId xmlns:a16="http://schemas.microsoft.com/office/drawing/2014/main" id="{9C046E25-F5A6-3C91-F665-5085DCD2DA07}"/>
+          <p:cNvPr id="9" name="Рисунок 8">
+            <a:extLst>
+              <a:ext uri="{FF2B5EF4-FFF2-40B4-BE49-F238E27FC236}">
+                <a16:creationId xmlns:a16="http://schemas.microsoft.com/office/drawing/2014/main" id="{E29F6178-0012-76A5-1B24-3DA9B63C7FF7}"/>
               </a:ext>
             </a:extLst>
           </p:cNvPr>
@@ -3608,8 +4719,38 @@
         </p:blipFill>
         <p:spPr>
           <a:xfrm>
-            <a:off x="6534150" y="1295400"/>
-            <a:ext cx="5073786" cy="3104356"/>
+            <a:off x="9076035" y="1246455"/>
+            <a:ext cx="3115965" cy="2903766"/>
+          </a:xfrm>
+          <a:prstGeom prst="rect">
+            <a:avLst/>
+          </a:prstGeom>
+        </p:spPr>
+      </p:pic>
+      <p:pic>
+        <p:nvPicPr>
+          <p:cNvPr id="12" name="Рисунок 11">
+            <a:extLst>
+              <a:ext uri="{FF2B5EF4-FFF2-40B4-BE49-F238E27FC236}">
+                <a16:creationId xmlns:a16="http://schemas.microsoft.com/office/drawing/2014/main" id="{8C016BF3-33A2-0FFC-1CAC-9E0CB973CD3E}"/>
+              </a:ext>
+            </a:extLst>
+          </p:cNvPr>
+          <p:cNvPicPr>
+            <a:picLocks noChangeAspect="1"/>
+          </p:cNvPicPr>
+          <p:nvPr/>
+        </p:nvPicPr>
+        <p:blipFill>
+          <a:blip r:embed="rId3"/>
+          <a:stretch>
+            <a:fillRect/>
+          </a:stretch>
+        </p:blipFill>
+        <p:spPr>
+          <a:xfrm>
+            <a:off x="8476400" y="3946057"/>
+            <a:ext cx="3715600" cy="2911943"/>
           </a:xfrm>
           <a:prstGeom prst="rect">
             <a:avLst/>
@@ -3619,7 +4760,7 @@
     </p:spTree>
     <p:extLst>
       <p:ext uri="{BB962C8B-B14F-4D97-AF65-F5344CB8AC3E}">
-        <p14:creationId xmlns:p14="http://schemas.microsoft.com/office/powerpoint/2010/main" val="2295334937"/>
+        <p14:creationId xmlns:p14="http://schemas.microsoft.com/office/powerpoint/2010/main" val="3830945627"/>
       </p:ext>
     </p:extLst>
   </p:cSld>
@@ -3648,10 +4789,10 @@
       </p:grpSpPr>
       <p:sp>
         <p:nvSpPr>
-          <p:cNvPr id="2" name="Заголовок 1">
-            <a:extLst>
-              <a:ext uri="{FF2B5EF4-FFF2-40B4-BE49-F238E27FC236}">
-                <a16:creationId xmlns:a16="http://schemas.microsoft.com/office/drawing/2014/main" id="{C4D56B7A-41B0-7BD1-9CC7-EACC45F7ED89}"/>
+          <p:cNvPr id="4" name="Заголовок 3">
+            <a:extLst>
+              <a:ext uri="{FF2B5EF4-FFF2-40B4-BE49-F238E27FC236}">
+                <a16:creationId xmlns:a16="http://schemas.microsoft.com/office/drawing/2014/main" id="{CE228031-626F-2E9C-A281-6879BD35A796}"/>
               </a:ext>
             </a:extLst>
           </p:cNvPr>
@@ -3669,17 +4810,22 @@
           <a:p>
             <a:r>
               <a:rPr lang="ru-RU" dirty="0"/>
-              <a:t>Начало работы</a:t>
-            </a:r>
-          </a:p>
-        </p:txBody>
-      </p:sp>
-      <p:sp>
-        <p:nvSpPr>
-          <p:cNvPr id="3" name="Объект 2">
-            <a:extLst>
-              <a:ext uri="{FF2B5EF4-FFF2-40B4-BE49-F238E27FC236}">
-                <a16:creationId xmlns:a16="http://schemas.microsoft.com/office/drawing/2014/main" id="{9A034B3B-9836-99CD-49D0-F2AEF211308B}"/>
+              <a:t>Операторы и выражения</a:t>
+            </a:r>
+            <a:r>
+              <a:rPr lang="en-US" dirty="0"/>
+              <a:t> (2/2)</a:t>
+            </a:r>
+            <a:endParaRPr lang="ru-RU" dirty="0"/>
+          </a:p>
+        </p:txBody>
+      </p:sp>
+      <p:sp>
+        <p:nvSpPr>
+          <p:cNvPr id="5" name="Объект 4">
+            <a:extLst>
+              <a:ext uri="{FF2B5EF4-FFF2-40B4-BE49-F238E27FC236}">
+                <a16:creationId xmlns:a16="http://schemas.microsoft.com/office/drawing/2014/main" id="{92B99C8A-AB97-793A-D096-FF305BB9F53D}"/>
               </a:ext>
             </a:extLst>
           </p:cNvPr>
@@ -3690,297 +4836,93 @@
             <p:ph idx="1"/>
           </p:nvPr>
         </p:nvSpPr>
-        <p:spPr/>
+        <p:spPr>
+          <a:xfrm>
+            <a:off x="838199" y="1503734"/>
+            <a:ext cx="9771646" cy="966750"/>
+          </a:xfrm>
+        </p:spPr>
         <p:txBody>
           <a:bodyPr>
-            <a:normAutofit fontScale="92500" lnSpcReduction="10000"/>
+            <a:normAutofit/>
           </a:bodyPr>
           <a:lstStyle/>
           <a:p>
             <a:r>
               <a:rPr lang="ru-RU" dirty="0"/>
-              <a:t>Первая программа: </a:t>
+              <a:t>Выражения могут быть частью операторов.</a:t>
             </a:r>
             <a:r>
               <a:rPr lang="en-US" dirty="0"/>
-              <a:t>main.rs</a:t>
-            </a:r>
-          </a:p>
-          <a:p>
-            <a:pPr lvl="1"/>
-            <a:r>
-              <a:rPr lang="en-US" sz="1800" b="0" i="0" u="none" strike="noStrike" dirty="0" err="1">
-                <a:solidFill>
-                  <a:srgbClr val="0000FF"/>
-                </a:solidFill>
-                <a:effectLst/>
-                <a:latin typeface="Consolas" panose="020B0609020204030204" pitchFamily="49" charset="0"/>
-              </a:rPr>
-              <a:t>fn</a:t>
-            </a:r>
-            <a:r>
-              <a:rPr lang="en-US" sz="1800" b="0" i="0" u="none" strike="noStrike" dirty="0">
-                <a:solidFill>
-                  <a:srgbClr val="000000"/>
-                </a:solidFill>
-                <a:effectLst/>
-                <a:latin typeface="Consolas" panose="020B0609020204030204" pitchFamily="49" charset="0"/>
-              </a:rPr>
               <a:t> </a:t>
             </a:r>
-            <a:r>
-              <a:rPr lang="en-US" sz="1800" b="0" i="0" u="none" strike="noStrike" dirty="0">
-                <a:solidFill>
-                  <a:srgbClr val="A31515"/>
-                </a:solidFill>
-                <a:effectLst/>
-                <a:latin typeface="Consolas" panose="020B0609020204030204" pitchFamily="49" charset="0"/>
-              </a:rPr>
-              <a:t>main</a:t>
-            </a:r>
-            <a:r>
-              <a:rPr lang="en-US" sz="1800" b="0" i="0" u="none" strike="noStrike" dirty="0">
-                <a:solidFill>
-                  <a:srgbClr val="000000"/>
-                </a:solidFill>
-                <a:effectLst/>
-                <a:latin typeface="Consolas" panose="020B0609020204030204" pitchFamily="49" charset="0"/>
-              </a:rPr>
-              <a:t>() {</a:t>
-            </a:r>
-            <a:br>
-              <a:rPr lang="en-US" sz="1800" b="0" i="0" u="none" strike="noStrike" dirty="0">
-                <a:solidFill>
-                  <a:srgbClr val="000000"/>
-                </a:solidFill>
-                <a:effectLst/>
-                <a:latin typeface="Consolas" panose="020B0609020204030204" pitchFamily="49" charset="0"/>
-              </a:rPr>
-            </a:br>
-            <a:r>
-              <a:rPr lang="en-US" sz="1800" b="0" i="0" u="none" strike="noStrike" dirty="0">
-                <a:solidFill>
-                  <a:srgbClr val="000000"/>
-                </a:solidFill>
-                <a:effectLst/>
-                <a:latin typeface="Consolas" panose="020B0609020204030204" pitchFamily="49" charset="0"/>
-              </a:rPr>
-              <a:t>	</a:t>
-            </a:r>
-            <a:r>
-              <a:rPr lang="en-US" sz="1800" b="0" i="0" u="none" strike="noStrike" dirty="0" err="1">
-                <a:solidFill>
-                  <a:srgbClr val="0000FF"/>
-                </a:solidFill>
-                <a:effectLst/>
-                <a:latin typeface="Consolas" panose="020B0609020204030204" pitchFamily="49" charset="0"/>
-              </a:rPr>
-              <a:t>println</a:t>
-            </a:r>
-            <a:r>
-              <a:rPr lang="en-US" sz="1800" b="0" i="0" u="none" strike="noStrike" dirty="0">
-                <a:solidFill>
-                  <a:srgbClr val="0000FF"/>
-                </a:solidFill>
-                <a:effectLst/>
-                <a:latin typeface="Consolas" panose="020B0609020204030204" pitchFamily="49" charset="0"/>
-              </a:rPr>
-              <a:t>!</a:t>
-            </a:r>
-            <a:r>
-              <a:rPr lang="en-US" sz="1800" b="0" i="0" u="none" strike="noStrike" dirty="0">
-                <a:solidFill>
-                  <a:srgbClr val="000000"/>
-                </a:solidFill>
-                <a:effectLst/>
-                <a:latin typeface="Consolas" panose="020B0609020204030204" pitchFamily="49" charset="0"/>
-              </a:rPr>
-              <a:t>(</a:t>
-            </a:r>
-            <a:r>
-              <a:rPr lang="en-US" sz="1800" b="0" i="0" u="none" strike="noStrike" dirty="0">
-                <a:solidFill>
-                  <a:srgbClr val="A31515"/>
-                </a:solidFill>
-                <a:effectLst/>
-                <a:latin typeface="Consolas" panose="020B0609020204030204" pitchFamily="49" charset="0"/>
-              </a:rPr>
-              <a:t>"Hello, world!"</a:t>
-            </a:r>
-            <a:r>
-              <a:rPr lang="en-US" sz="1800" b="0" i="0" u="none" strike="noStrike" dirty="0">
-                <a:solidFill>
-                  <a:srgbClr val="000000"/>
-                </a:solidFill>
-                <a:effectLst/>
-                <a:latin typeface="Consolas" panose="020B0609020204030204" pitchFamily="49" charset="0"/>
-              </a:rPr>
-              <a:t>);</a:t>
-            </a:r>
-            <a:r>
-              <a:rPr lang="ru-RU" sz="1800" b="0" i="0" u="none" strike="noStrike" dirty="0">
-                <a:solidFill>
-                  <a:srgbClr val="000000"/>
-                </a:solidFill>
-                <a:effectLst/>
-                <a:latin typeface="Consolas" panose="020B0609020204030204" pitchFamily="49" charset="0"/>
-              </a:rPr>
-              <a:t> </a:t>
-            </a:r>
-            <a:r>
-              <a:rPr lang="en-US" sz="1800" b="0" i="0" u="none" strike="noStrike" dirty="0">
-                <a:solidFill>
-                  <a:schemeClr val="accent6">
-                    <a:lumMod val="75000"/>
-                  </a:schemeClr>
-                </a:solidFill>
-                <a:effectLst/>
-                <a:latin typeface="Consolas" panose="020B0609020204030204" pitchFamily="49" charset="0"/>
-              </a:rPr>
-              <a:t>//main() – </a:t>
-            </a:r>
-            <a:r>
-              <a:rPr lang="ru-RU" sz="1800" b="0" i="0" u="none" strike="noStrike" dirty="0">
-                <a:solidFill>
-                  <a:schemeClr val="accent6">
-                    <a:lumMod val="75000"/>
-                  </a:schemeClr>
-                </a:solidFill>
-                <a:effectLst/>
-                <a:latin typeface="Consolas" panose="020B0609020204030204" pitchFamily="49" charset="0"/>
-              </a:rPr>
-              <a:t>точка входа в программу, ! – после функции означает вызов макроса</a:t>
-            </a:r>
-            <a:br>
-              <a:rPr lang="en-US" sz="1800" b="0" i="0" u="none" strike="noStrike" dirty="0">
-                <a:solidFill>
-                  <a:srgbClr val="000000"/>
-                </a:solidFill>
-                <a:effectLst/>
-                <a:latin typeface="Consolas" panose="020B0609020204030204" pitchFamily="49" charset="0"/>
-              </a:rPr>
-            </a:br>
-            <a:r>
-              <a:rPr lang="en-US" sz="1800" b="0" i="0" u="none" strike="noStrike" dirty="0">
-                <a:solidFill>
-                  <a:srgbClr val="000000"/>
-                </a:solidFill>
-                <a:effectLst/>
-                <a:latin typeface="Consolas" panose="020B0609020204030204" pitchFamily="49" charset="0"/>
-              </a:rPr>
-              <a:t>}</a:t>
-            </a:r>
-          </a:p>
-          <a:p>
-            <a:r>
-              <a:rPr lang="ru-RU" dirty="0">
-                <a:solidFill>
-                  <a:srgbClr val="000000"/>
-                </a:solidFill>
-              </a:rPr>
-              <a:t>Сборка и запуск</a:t>
-            </a:r>
-          </a:p>
-          <a:p>
-            <a:pPr lvl="1"/>
-            <a:r>
-              <a:rPr lang="en-US" sz="1800" b="0" i="0" u="none" strike="noStrike" dirty="0" err="1">
-                <a:solidFill>
-                  <a:srgbClr val="000000"/>
-                </a:solidFill>
-                <a:effectLst/>
-                <a:latin typeface="Consolas" panose="020B0609020204030204" pitchFamily="49" charset="0"/>
-              </a:rPr>
-              <a:t>rustc</a:t>
-            </a:r>
-            <a:r>
-              <a:rPr lang="en-US" sz="1800" b="0" i="0" u="none" strike="noStrike" dirty="0">
-                <a:solidFill>
-                  <a:srgbClr val="000000"/>
-                </a:solidFill>
-                <a:effectLst/>
-                <a:latin typeface="Consolas" panose="020B0609020204030204" pitchFamily="49" charset="0"/>
-              </a:rPr>
-              <a:t> main.rs</a:t>
-            </a:r>
-            <a:br>
-              <a:rPr lang="en-US" sz="1800" b="0" i="0" u="none" strike="noStrike" dirty="0">
-                <a:solidFill>
-                  <a:srgbClr val="000000"/>
-                </a:solidFill>
-                <a:effectLst/>
-                <a:latin typeface="Consolas" panose="020B0609020204030204" pitchFamily="49" charset="0"/>
-              </a:rPr>
-            </a:br>
-            <a:r>
-              <a:rPr lang="en-US" sz="1800" b="0" i="0" u="none" strike="noStrike" dirty="0">
-                <a:solidFill>
-                  <a:srgbClr val="000000"/>
-                </a:solidFill>
-                <a:effectLst/>
-                <a:latin typeface="Consolas" panose="020B0609020204030204" pitchFamily="49" charset="0"/>
-              </a:rPr>
-              <a:t>./main</a:t>
-            </a:r>
-            <a:endParaRPr lang="en-US" dirty="0">
-              <a:solidFill>
-                <a:srgbClr val="000000"/>
-              </a:solidFill>
-            </a:endParaRPr>
-          </a:p>
-          <a:p>
-            <a:r>
-              <a:rPr lang="ru-RU" dirty="0">
-                <a:solidFill>
-                  <a:srgbClr val="000000"/>
-                </a:solidFill>
-              </a:rPr>
-              <a:t>Замечания</a:t>
-            </a:r>
-          </a:p>
-          <a:p>
-            <a:pPr lvl="1"/>
-            <a:r>
-              <a:rPr lang="ru-RU" dirty="0">
-                <a:solidFill>
-                  <a:srgbClr val="000000"/>
-                </a:solidFill>
-              </a:rPr>
-              <a:t>Требуется явное указание имени файла.</a:t>
-            </a:r>
-          </a:p>
-          <a:p>
-            <a:pPr lvl="1"/>
-            <a:r>
-              <a:rPr lang="ru-RU" dirty="0">
-                <a:solidFill>
-                  <a:srgbClr val="000000"/>
-                </a:solidFill>
-              </a:rPr>
-              <a:t>Если потребуется указать флаги компилятора или внешние зависимости, то команда усложнится.</a:t>
-            </a:r>
-          </a:p>
-          <a:p>
-            <a:pPr lvl="1"/>
-            <a:r>
-              <a:rPr lang="ru-RU" dirty="0">
-                <a:solidFill>
-                  <a:srgbClr val="000000"/>
-                </a:solidFill>
-              </a:rPr>
-              <a:t>Вручную получение правильных версий зависимостей и поддержание их в актуальном состоянии.</a:t>
-            </a:r>
-          </a:p>
-          <a:p>
-            <a:pPr lvl="1"/>
-            <a:endParaRPr lang="ru-RU" dirty="0"/>
-          </a:p>
-        </p:txBody>
-      </p:sp>
+          </a:p>
+        </p:txBody>
+      </p:sp>
+      <p:pic>
+        <p:nvPicPr>
+          <p:cNvPr id="16" name="Рисунок 15">
+            <a:extLst>
+              <a:ext uri="{FF2B5EF4-FFF2-40B4-BE49-F238E27FC236}">
+                <a16:creationId xmlns:a16="http://schemas.microsoft.com/office/drawing/2014/main" id="{3FE32BE9-E5CD-4122-1F16-FC41D9C3803C}"/>
+              </a:ext>
+            </a:extLst>
+          </p:cNvPr>
+          <p:cNvPicPr>
+            <a:picLocks noChangeAspect="1"/>
+          </p:cNvPicPr>
+          <p:nvPr/>
+        </p:nvPicPr>
+        <p:blipFill>
+          <a:blip r:embed="rId2"/>
+          <a:stretch>
+            <a:fillRect/>
+          </a:stretch>
+        </p:blipFill>
+        <p:spPr>
+          <a:xfrm>
+            <a:off x="5294432" y="2618969"/>
+            <a:ext cx="6897568" cy="3536397"/>
+          </a:xfrm>
+          <a:prstGeom prst="rect">
+            <a:avLst/>
+          </a:prstGeom>
+        </p:spPr>
+      </p:pic>
+      <p:pic>
+        <p:nvPicPr>
+          <p:cNvPr id="20" name="Рисунок 19">
+            <a:extLst>
+              <a:ext uri="{FF2B5EF4-FFF2-40B4-BE49-F238E27FC236}">
+                <a16:creationId xmlns:a16="http://schemas.microsoft.com/office/drawing/2014/main" id="{88521BAB-2AEE-4998-CB5A-F4BF7745FC45}"/>
+              </a:ext>
+            </a:extLst>
+          </p:cNvPr>
+          <p:cNvPicPr>
+            <a:picLocks noChangeAspect="1"/>
+          </p:cNvPicPr>
+          <p:nvPr/>
+        </p:nvPicPr>
+        <p:blipFill>
+          <a:blip r:embed="rId3"/>
+          <a:stretch>
+            <a:fillRect/>
+          </a:stretch>
+        </p:blipFill>
+        <p:spPr>
+          <a:xfrm>
+            <a:off x="-20981" y="2619667"/>
+            <a:ext cx="5315413" cy="3535699"/>
+          </a:xfrm>
+          <a:prstGeom prst="rect">
+            <a:avLst/>
+          </a:prstGeom>
+        </p:spPr>
+      </p:pic>
     </p:spTree>
     <p:extLst>
       <p:ext uri="{BB962C8B-B14F-4D97-AF65-F5344CB8AC3E}">
-        <p14:creationId xmlns:p14="http://schemas.microsoft.com/office/powerpoint/2010/main" val="1183640725"/>
+        <p14:creationId xmlns:p14="http://schemas.microsoft.com/office/powerpoint/2010/main" val="3343491982"/>
       </p:ext>
     </p:extLst>
   </p:cSld>
@@ -4009,10 +4951,10 @@
       </p:grpSpPr>
       <p:sp>
         <p:nvSpPr>
-          <p:cNvPr id="2" name="Заголовок 1">
-            <a:extLst>
-              <a:ext uri="{FF2B5EF4-FFF2-40B4-BE49-F238E27FC236}">
-                <a16:creationId xmlns:a16="http://schemas.microsoft.com/office/drawing/2014/main" id="{E77B993F-B409-9612-8528-FB24F1EB80B4}"/>
+          <p:cNvPr id="4" name="Заголовок 3">
+            <a:extLst>
+              <a:ext uri="{FF2B5EF4-FFF2-40B4-BE49-F238E27FC236}">
+                <a16:creationId xmlns:a16="http://schemas.microsoft.com/office/drawing/2014/main" id="{CE228031-626F-2E9C-A281-6879BD35A796}"/>
               </a:ext>
             </a:extLst>
           </p:cNvPr>
@@ -4030,22 +4972,17 @@
           <a:p>
             <a:r>
               <a:rPr lang="ru-RU" dirty="0"/>
-              <a:t>Использование</a:t>
-            </a:r>
-            <a:r>
-              <a:rPr lang="en-US" dirty="0"/>
-              <a:t> Cargo</a:t>
-            </a:r>
-            <a:endParaRPr lang="ru-RU" dirty="0"/>
-          </a:p>
-        </p:txBody>
-      </p:sp>
-      <p:sp>
-        <p:nvSpPr>
-          <p:cNvPr id="3" name="Объект 2">
-            <a:extLst>
-              <a:ext uri="{FF2B5EF4-FFF2-40B4-BE49-F238E27FC236}">
-                <a16:creationId xmlns:a16="http://schemas.microsoft.com/office/drawing/2014/main" id="{D263360E-D17F-41BB-9E1C-48524DF370A0}"/>
+              <a:t>Функции</a:t>
+            </a:r>
+          </a:p>
+        </p:txBody>
+      </p:sp>
+      <p:sp>
+        <p:nvSpPr>
+          <p:cNvPr id="5" name="Объект 4">
+            <a:extLst>
+              <a:ext uri="{FF2B5EF4-FFF2-40B4-BE49-F238E27FC236}">
+                <a16:creationId xmlns:a16="http://schemas.microsoft.com/office/drawing/2014/main" id="{92B99C8A-AB97-793A-D096-FF305BB9F53D}"/>
               </a:ext>
             </a:extLst>
           </p:cNvPr>
@@ -4056,600 +4993,204 @@
             <p:ph idx="1"/>
           </p:nvPr>
         </p:nvSpPr>
-        <p:spPr/>
+        <p:spPr>
+          <a:xfrm>
+            <a:off x="979990" y="1439100"/>
+            <a:ext cx="5410200" cy="4648994"/>
+          </a:xfrm>
+        </p:spPr>
         <p:txBody>
           <a:bodyPr>
-            <a:normAutofit lnSpcReduction="10000"/>
+            <a:normAutofit/>
           </a:bodyPr>
           <a:lstStyle/>
-          <a:p>
-            <a:r>
-              <a:rPr lang="en-US" i="1" dirty="0"/>
-              <a:t>Cargo </a:t>
-            </a:r>
-            <a:r>
-              <a:rPr lang="en-US" dirty="0"/>
-              <a:t>— </a:t>
-            </a:r>
-            <a:r>
-              <a:rPr lang="ru-RU" dirty="0"/>
-              <a:t>менеджер пакетов </a:t>
-            </a:r>
-            <a:r>
-              <a:rPr lang="en-US" dirty="0"/>
-              <a:t>Rust. </a:t>
-            </a:r>
-          </a:p>
-          <a:p>
-            <a:r>
-              <a:rPr lang="ru-RU" dirty="0"/>
-              <a:t>Создание нового проекта</a:t>
-            </a:r>
-          </a:p>
-          <a:p>
-            <a:pPr lvl="1"/>
-            <a:r>
-              <a:rPr lang="en-US" sz="1800" b="0" i="0" u="none" strike="noStrike" dirty="0">
-                <a:solidFill>
-                  <a:srgbClr val="000000"/>
-                </a:solidFill>
-                <a:effectLst/>
-                <a:latin typeface="Consolas" panose="020B0609020204030204" pitchFamily="49" charset="0"/>
-              </a:rPr>
-              <a:t>$ cargo new </a:t>
-            </a:r>
-            <a:r>
-              <a:rPr lang="en-US" sz="1800" b="0" i="0" u="none" strike="noStrike" dirty="0" err="1">
-                <a:solidFill>
-                  <a:srgbClr val="000000"/>
-                </a:solidFill>
-                <a:effectLst/>
-                <a:latin typeface="Consolas" panose="020B0609020204030204" pitchFamily="49" charset="0"/>
-              </a:rPr>
-              <a:t>hello_world</a:t>
-            </a:r>
-            <a:endParaRPr lang="ru-RU" sz="1800" b="0" i="0" u="none" strike="noStrike" dirty="0">
-              <a:solidFill>
-                <a:srgbClr val="000000"/>
-              </a:solidFill>
-              <a:effectLst/>
-              <a:latin typeface="Consolas" panose="020B0609020204030204" pitchFamily="49" charset="0"/>
-            </a:endParaRPr>
-          </a:p>
           <a:p>
             <a:r>
               <a:rPr lang="ru-RU" dirty="0">
                 <a:solidFill>
-                  <a:srgbClr val="000000"/>
+                  <a:schemeClr val="accent1"/>
                 </a:solidFill>
               </a:rPr>
-              <a:t>После этого структура проекта:</a:t>
-            </a:r>
-            <a:endParaRPr lang="en-US" dirty="0">
-              <a:solidFill>
-                <a:srgbClr val="000000"/>
-              </a:solidFill>
-            </a:endParaRPr>
-          </a:p>
-          <a:p>
-            <a:pPr lvl="1"/>
-            <a:r>
-              <a:rPr lang="en-US" sz="1800" b="0" i="0" u="none" strike="noStrike" dirty="0" err="1">
+              <a:t>Функции</a:t>
+            </a:r>
+            <a:r>
+              <a:rPr lang="ru-RU" dirty="0"/>
+              <a:t> в </a:t>
+            </a:r>
+            <a:r>
+              <a:rPr lang="en-US" dirty="0"/>
+              <a:t>Rust </a:t>
+            </a:r>
+            <a:r>
+              <a:rPr lang="ru-RU" dirty="0"/>
+              <a:t>определяются с помощью ключевого слова </a:t>
+            </a:r>
+            <a:r>
+              <a:rPr lang="en-US" b="1" dirty="0">
                 <a:solidFill>
-                  <a:srgbClr val="0000FF"/>
+                  <a:schemeClr val="accent1"/>
                 </a:solidFill>
-                <a:effectLst/>
-                <a:latin typeface="Consolas" panose="020B0609020204030204" pitchFamily="49" charset="0"/>
+                <a:latin typeface="Courier New" panose="02070309020205020404" pitchFamily="49" charset="0"/>
+                <a:cs typeface="Courier New" panose="02070309020205020404" pitchFamily="49" charset="0"/>
               </a:rPr>
-              <a:t>hello_world</a:t>
-            </a:r>
-            <a:r>
-              <a:rPr lang="en-US" sz="1800" b="0" i="0" u="none" strike="noStrike" dirty="0">
+              <a:t>fn</a:t>
+            </a:r>
+            <a:r>
+              <a:rPr lang="en-US" dirty="0"/>
+              <a:t>, </a:t>
+            </a:r>
+            <a:r>
+              <a:rPr lang="ru-RU" dirty="0"/>
+              <a:t>за которым следуют имя функции, параметры и тип возвращаемого значения после </a:t>
+            </a:r>
+            <a:r>
+              <a:rPr lang="en-US" dirty="0"/>
+              <a:t>( </a:t>
+            </a:r>
+            <a:r>
+              <a:rPr lang="en-US" b="1" dirty="0">
                 <a:solidFill>
-                  <a:srgbClr val="000000"/>
+                  <a:schemeClr val="accent1"/>
                 </a:solidFill>
-                <a:effectLst/>
-                <a:latin typeface="Consolas" panose="020B0609020204030204" pitchFamily="49" charset="0"/>
               </a:rPr>
-              <a:t>/</a:t>
-            </a:r>
-            <a:br>
-              <a:rPr lang="en-US" sz="1800" b="0" i="0" u="none" strike="noStrike" dirty="0">
-                <a:solidFill>
-                  <a:srgbClr val="000000"/>
-                </a:solidFill>
-                <a:effectLst/>
-                <a:latin typeface="Consolas" panose="020B0609020204030204" pitchFamily="49" charset="0"/>
-              </a:rPr>
-            </a:br>
-            <a:r>
-              <a:rPr lang="en-US" sz="1800" b="0" i="0" u="none" strike="noStrike" dirty="0">
-                <a:solidFill>
-                  <a:srgbClr val="000000"/>
-                </a:solidFill>
-                <a:effectLst/>
-                <a:latin typeface="Consolas" panose="020B0609020204030204" pitchFamily="49" charset="0"/>
-              </a:rPr>
-              <a:t>  ├── </a:t>
-            </a:r>
-            <a:r>
-              <a:rPr lang="en-US" sz="1800" b="0" i="0" u="none" strike="noStrike" dirty="0" err="1">
-                <a:solidFill>
-                  <a:srgbClr val="0000FF"/>
-                </a:solidFill>
-                <a:effectLst/>
-                <a:latin typeface="Consolas" panose="020B0609020204030204" pitchFamily="49" charset="0"/>
-              </a:rPr>
-              <a:t>Cargo</a:t>
-            </a:r>
-            <a:r>
-              <a:rPr lang="en-US" sz="1800" b="0" i="0" u="none" strike="noStrike" dirty="0" err="1">
-                <a:solidFill>
-                  <a:srgbClr val="000000"/>
-                </a:solidFill>
-                <a:effectLst/>
-                <a:latin typeface="Consolas" panose="020B0609020204030204" pitchFamily="49" charset="0"/>
-              </a:rPr>
-              <a:t>.toml</a:t>
-            </a:r>
-            <a:br>
-              <a:rPr lang="en-US" sz="1800" b="0" i="0" u="none" strike="noStrike" dirty="0">
-                <a:solidFill>
-                  <a:srgbClr val="000000"/>
-                </a:solidFill>
-                <a:effectLst/>
-                <a:latin typeface="Consolas" panose="020B0609020204030204" pitchFamily="49" charset="0"/>
-              </a:rPr>
-            </a:br>
-            <a:r>
-              <a:rPr lang="en-US" sz="1800" b="0" i="0" u="none" strike="noStrike" dirty="0">
-                <a:solidFill>
-                  <a:srgbClr val="000000"/>
-                </a:solidFill>
-                <a:effectLst/>
-                <a:latin typeface="Consolas" panose="020B0609020204030204" pitchFamily="49" charset="0"/>
-              </a:rPr>
-              <a:t>  ├── </a:t>
-            </a:r>
-            <a:r>
-              <a:rPr lang="en-US" sz="1800" b="0" i="0" u="none" strike="noStrike" dirty="0" err="1">
-                <a:solidFill>
-                  <a:srgbClr val="0000FF"/>
-                </a:solidFill>
-                <a:effectLst/>
-                <a:latin typeface="Consolas" panose="020B0609020204030204" pitchFamily="49" charset="0"/>
-              </a:rPr>
-              <a:t>Cargo</a:t>
-            </a:r>
-            <a:r>
-              <a:rPr lang="en-US" sz="1800" b="0" i="0" u="none" strike="noStrike" dirty="0" err="1">
-                <a:solidFill>
-                  <a:srgbClr val="000000"/>
-                </a:solidFill>
-                <a:effectLst/>
-                <a:latin typeface="Consolas" panose="020B0609020204030204" pitchFamily="49" charset="0"/>
-              </a:rPr>
-              <a:t>.lock</a:t>
-            </a:r>
-            <a:br>
-              <a:rPr lang="en-US" sz="1800" b="0" i="0" u="none" strike="noStrike" dirty="0">
-                <a:solidFill>
-                  <a:srgbClr val="000000"/>
-                </a:solidFill>
-                <a:effectLst/>
-                <a:latin typeface="Consolas" panose="020B0609020204030204" pitchFamily="49" charset="0"/>
-              </a:rPr>
-            </a:br>
-            <a:r>
-              <a:rPr lang="en-US" sz="1800" b="0" i="0" u="none" strike="noStrike" dirty="0">
-                <a:solidFill>
-                  <a:srgbClr val="000000"/>
-                </a:solidFill>
-                <a:effectLst/>
-                <a:latin typeface="Consolas" panose="020B0609020204030204" pitchFamily="49" charset="0"/>
-              </a:rPr>
-              <a:t>  ├── .</a:t>
-            </a:r>
-            <a:r>
-              <a:rPr lang="en-US" sz="1800" b="0" i="0" u="none" strike="noStrike" dirty="0" err="1">
-                <a:solidFill>
-                  <a:srgbClr val="000000"/>
-                </a:solidFill>
-                <a:effectLst/>
-                <a:latin typeface="Consolas" panose="020B0609020204030204" pitchFamily="49" charset="0"/>
-              </a:rPr>
-              <a:t>gitignore</a:t>
-            </a:r>
-            <a:br>
-              <a:rPr lang="en-US" sz="1800" b="0" i="0" u="none" strike="noStrike" dirty="0">
-                <a:solidFill>
-                  <a:srgbClr val="000000"/>
-                </a:solidFill>
-                <a:effectLst/>
-                <a:latin typeface="Consolas" panose="020B0609020204030204" pitchFamily="49" charset="0"/>
-              </a:rPr>
-            </a:br>
-            <a:r>
-              <a:rPr lang="en-US" sz="1800" b="0" i="0" u="none" strike="noStrike" dirty="0">
-                <a:solidFill>
-                  <a:srgbClr val="000000"/>
-                </a:solidFill>
-                <a:effectLst/>
-                <a:latin typeface="Consolas" panose="020B0609020204030204" pitchFamily="49" charset="0"/>
-              </a:rPr>
-              <a:t>  └── </a:t>
-            </a:r>
-            <a:r>
-              <a:rPr lang="en-US" sz="1800" b="0" i="0" u="none" strike="noStrike" dirty="0">
-                <a:solidFill>
-                  <a:srgbClr val="0000FF"/>
-                </a:solidFill>
-                <a:effectLst/>
-                <a:latin typeface="Consolas" panose="020B0609020204030204" pitchFamily="49" charset="0"/>
-              </a:rPr>
-              <a:t>target</a:t>
-            </a:r>
-            <a:r>
-              <a:rPr lang="en-US" sz="1800" b="0" i="0" u="none" strike="noStrike" dirty="0">
-                <a:solidFill>
-                  <a:srgbClr val="000000"/>
-                </a:solidFill>
-                <a:effectLst/>
-                <a:latin typeface="Consolas" panose="020B0609020204030204" pitchFamily="49" charset="0"/>
-              </a:rPr>
-              <a:t>/</a:t>
-            </a:r>
-            <a:br>
-              <a:rPr lang="en-US" sz="1800" b="0" i="0" u="none" strike="noStrike" dirty="0">
-                <a:solidFill>
-                  <a:srgbClr val="000000"/>
-                </a:solidFill>
-                <a:effectLst/>
-                <a:latin typeface="Consolas" panose="020B0609020204030204" pitchFamily="49" charset="0"/>
-              </a:rPr>
-            </a:br>
-            <a:r>
-              <a:rPr lang="en-US" sz="1800" b="0" i="0" u="none" strike="noStrike" dirty="0">
-                <a:solidFill>
-                  <a:srgbClr val="000000"/>
-                </a:solidFill>
-                <a:effectLst/>
-                <a:latin typeface="Consolas" panose="020B0609020204030204" pitchFamily="49" charset="0"/>
-              </a:rPr>
-              <a:t>  └── </a:t>
-            </a:r>
-            <a:r>
-              <a:rPr lang="en-US" sz="1800" b="0" i="0" u="none" strike="noStrike" dirty="0" err="1">
-                <a:solidFill>
-                  <a:srgbClr val="0000FF"/>
-                </a:solidFill>
-                <a:effectLst/>
-                <a:latin typeface="Consolas" panose="020B0609020204030204" pitchFamily="49" charset="0"/>
-              </a:rPr>
-              <a:t>src</a:t>
-            </a:r>
-            <a:r>
-              <a:rPr lang="en-US" sz="1800" b="0" i="0" u="none" strike="noStrike" dirty="0">
-                <a:solidFill>
-                  <a:srgbClr val="000000"/>
-                </a:solidFill>
-                <a:effectLst/>
-                <a:latin typeface="Consolas" panose="020B0609020204030204" pitchFamily="49" charset="0"/>
-              </a:rPr>
-              <a:t>/</a:t>
-            </a:r>
-            <a:br>
-              <a:rPr lang="en-US" sz="1800" b="0" i="0" u="none" strike="noStrike" dirty="0">
-                <a:solidFill>
-                  <a:srgbClr val="000000"/>
-                </a:solidFill>
-                <a:effectLst/>
-                <a:latin typeface="Consolas" panose="020B0609020204030204" pitchFamily="49" charset="0"/>
-              </a:rPr>
-            </a:br>
-            <a:r>
-              <a:rPr lang="en-US" sz="1800" b="0" i="0" u="none" strike="noStrike" dirty="0">
-                <a:solidFill>
-                  <a:srgbClr val="000000"/>
-                </a:solidFill>
-                <a:effectLst/>
-                <a:latin typeface="Consolas" panose="020B0609020204030204" pitchFamily="49" charset="0"/>
-              </a:rPr>
-              <a:t>      └── </a:t>
-            </a:r>
-            <a:r>
-              <a:rPr lang="en-US" sz="1800" b="0" i="0" u="none" strike="noStrike" dirty="0">
-                <a:solidFill>
-                  <a:srgbClr val="0000FF"/>
-                </a:solidFill>
-                <a:effectLst/>
-                <a:latin typeface="Consolas" panose="020B0609020204030204" pitchFamily="49" charset="0"/>
-              </a:rPr>
-              <a:t>main</a:t>
-            </a:r>
-            <a:r>
-              <a:rPr lang="en-US" sz="1800" b="0" i="0" u="none" strike="noStrike" dirty="0">
-                <a:solidFill>
-                  <a:srgbClr val="000000"/>
-                </a:solidFill>
-                <a:effectLst/>
-                <a:latin typeface="Consolas" panose="020B0609020204030204" pitchFamily="49" charset="0"/>
-              </a:rPr>
-              <a:t>.rs</a:t>
-            </a:r>
-            <a:endParaRPr lang="ru-RU" dirty="0">
-              <a:solidFill>
-                <a:srgbClr val="000000"/>
-              </a:solidFill>
-            </a:endParaRPr>
-          </a:p>
-          <a:p>
-            <a:r>
-              <a:rPr lang="ru-RU" dirty="0"/>
-              <a:t>Запуск</a:t>
-            </a:r>
-          </a:p>
-          <a:p>
-            <a:pPr lvl="2"/>
-            <a:r>
-              <a:rPr lang="en-US" sz="1800" b="0" i="0" u="none" strike="noStrike" dirty="0">
-                <a:solidFill>
-                  <a:srgbClr val="000000"/>
-                </a:solidFill>
-                <a:effectLst/>
-                <a:latin typeface="Consolas" panose="020B0609020204030204" pitchFamily="49" charset="0"/>
-              </a:rPr>
-              <a:t>cargo build</a:t>
-            </a:r>
-            <a:br>
-              <a:rPr lang="en-US" sz="1800" b="0" i="0" u="none" strike="noStrike" dirty="0">
-                <a:solidFill>
-                  <a:srgbClr val="000000"/>
-                </a:solidFill>
-                <a:effectLst/>
-                <a:latin typeface="Consolas" panose="020B0609020204030204" pitchFamily="49" charset="0"/>
-              </a:rPr>
-            </a:br>
-            <a:r>
-              <a:rPr lang="en-US" sz="1800" b="0" i="0" u="none" strike="noStrike" dirty="0">
-                <a:solidFill>
-                  <a:srgbClr val="000000"/>
-                </a:solidFill>
-                <a:effectLst/>
-                <a:latin typeface="Consolas" panose="020B0609020204030204" pitchFamily="49" charset="0"/>
-              </a:rPr>
-              <a:t>./target/debug/</a:t>
-            </a:r>
-            <a:r>
-              <a:rPr lang="en-US" sz="1800" b="0" i="0" u="none" strike="noStrike" dirty="0" err="1">
-                <a:solidFill>
-                  <a:srgbClr val="000000"/>
-                </a:solidFill>
-                <a:effectLst/>
-                <a:latin typeface="Consolas" panose="020B0609020204030204" pitchFamily="49" charset="0"/>
-              </a:rPr>
-              <a:t>hello_world</a:t>
-            </a:r>
-            <a:endParaRPr lang="ru-RU" dirty="0"/>
-          </a:p>
-        </p:txBody>
-      </p:sp>
-      <p:sp>
-        <p:nvSpPr>
-          <p:cNvPr id="7" name="Rectangle 2">
-            <a:extLst>
-              <a:ext uri="{FF2B5EF4-FFF2-40B4-BE49-F238E27FC236}">
-                <a16:creationId xmlns:a16="http://schemas.microsoft.com/office/drawing/2014/main" id="{F3AC903B-7702-FF65-D00B-5C122F992206}"/>
-              </a:ext>
-            </a:extLst>
-          </p:cNvPr>
-          <p:cNvSpPr>
-            <a:spLocks noChangeArrowheads="1"/>
-          </p:cNvSpPr>
+              <a:t>-&gt; </a:t>
+            </a:r>
+            <a:r>
+              <a:rPr lang="en-US" dirty="0"/>
+              <a:t>)</a:t>
+            </a:r>
+            <a:r>
+              <a:rPr lang="ru-RU" dirty="0"/>
+              <a:t>.</a:t>
+            </a:r>
+            <a:endParaRPr lang="en-US" dirty="0"/>
+          </a:p>
+          <a:p>
+            <a:r>
+              <a:rPr lang="ru-RU" u="sng" dirty="0"/>
+              <a:t>Не важно где определяются </a:t>
+            </a:r>
+            <a:r>
+              <a:rPr lang="ru-RU" dirty="0"/>
+              <a:t>функции</a:t>
+            </a:r>
+            <a:r>
+              <a:rPr lang="en-US" dirty="0"/>
+              <a:t>; </a:t>
+            </a:r>
+            <a:r>
+              <a:rPr lang="ru-RU" u="sng" dirty="0"/>
+              <a:t>важно</a:t>
+            </a:r>
+            <a:r>
+              <a:rPr lang="ru-RU" dirty="0"/>
+              <a:t>, чтобы они были определены </a:t>
+            </a:r>
+            <a:r>
+              <a:rPr lang="ru-RU" u="sng" dirty="0"/>
+              <a:t>в области видимости</a:t>
+            </a:r>
+            <a:r>
+              <a:rPr lang="ru-RU" dirty="0"/>
+              <a:t>, которую может видеть вызывающая процедура.</a:t>
+            </a:r>
+          </a:p>
+        </p:txBody>
+      </p:sp>
+      <p:sp>
+        <p:nvSpPr>
+          <p:cNvPr id="8" name="TextBox 7">
+            <a:extLst>
+              <a:ext uri="{FF2B5EF4-FFF2-40B4-BE49-F238E27FC236}">
+                <a16:creationId xmlns:a16="http://schemas.microsoft.com/office/drawing/2014/main" id="{E514521E-3A47-2978-5CD8-12F32484E9D6}"/>
+              </a:ext>
+            </a:extLst>
+          </p:cNvPr>
+          <p:cNvSpPr txBox="1"/>
           <p:nvPr/>
         </p:nvSpPr>
-        <p:spPr bwMode="auto">
+        <p:spPr>
           <a:xfrm>
-            <a:off x="838200" y="3602038"/>
-            <a:ext cx="12192000" cy="0"/>
+            <a:off x="6531980" y="4957235"/>
+            <a:ext cx="5379452" cy="923330"/>
           </a:xfrm>
           <a:prstGeom prst="rect">
             <a:avLst/>
           </a:prstGeom>
           <a:noFill/>
-          <a:ln>
-            <a:noFill/>
-          </a:ln>
-          <a:effectLst/>
-          <a:extLst>
-            <a:ext uri="{909E8E84-426E-40DD-AFC4-6F175D3DCCD1}">
-              <a14:hiddenFill xmlns:a14="http://schemas.microsoft.com/office/drawing/2010/main">
-                <a:solidFill>
-                  <a:schemeClr val="accent1"/>
-                </a:solidFill>
-              </a14:hiddenFill>
-            </a:ext>
-            <a:ext uri="{91240B29-F687-4F45-9708-019B960494DF}">
-              <a14:hiddenLine xmlns:a14="http://schemas.microsoft.com/office/drawing/2010/main" w="9525">
-                <a:solidFill>
-                  <a:schemeClr val="tx1"/>
-                </a:solidFill>
-                <a:miter lim="800000"/>
-                <a:headEnd/>
-                <a:tailEnd/>
-              </a14:hiddenLine>
-            </a:ext>
-            <a:ext uri="{AF507438-7753-43E0-B8FC-AC1667EBCBE1}">
-              <a14:hiddenEffects xmlns:a14="http://schemas.microsoft.com/office/drawing/2010/main">
-                <a:effectLst>
-                  <a:outerShdw dist="35921" dir="2700000" algn="ctr" rotWithShape="0">
-                    <a:schemeClr val="bg2"/>
-                  </a:outerShdw>
-                </a:effectLst>
-              </a14:hiddenEffects>
-            </a:ext>
-          </a:extLst>
         </p:spPr>
         <p:txBody>
-          <a:bodyPr vert="horz" wrap="none" lIns="91440" tIns="45720" rIns="91440" bIns="45720" numCol="1" anchor="ctr" anchorCtr="0" compatLnSpc="1">
-            <a:prstTxWarp prst="textNoShape">
-              <a:avLst/>
-            </a:prstTxWarp>
+          <a:bodyPr wrap="square" rtlCol="0">
             <a:spAutoFit/>
           </a:bodyPr>
           <a:lstStyle/>
           <a:p>
-            <a:pPr marL="0" marR="0" lvl="0" indent="0" algn="l" defTabSz="914400" rtl="0" eaLnBrk="0" fontAlgn="base" latinLnBrk="0" hangingPunct="0">
-              <a:lnSpc>
-                <a:spcPct val="100000"/>
-              </a:lnSpc>
-              <a:spcBef>
-                <a:spcPct val="0"/>
-              </a:spcBef>
-              <a:spcAft>
-                <a:spcPct val="0"/>
-              </a:spcAft>
-              <a:buClrTx/>
-              <a:buSzTx/>
-              <a:buFontTx/>
-              <a:buNone/>
-              <a:tabLst/>
-            </a:pPr>
-            <a:br>
-              <a:rPr kumimoji="0" lang="ru-RU" altLang="ru-RU" sz="1800" b="0" i="0" u="none" strike="noStrike" cap="none" normalizeH="0" baseline="0">
-                <a:ln>
-                  <a:noFill/>
-                </a:ln>
-                <a:solidFill>
-                  <a:schemeClr val="tx1"/>
-                </a:solidFill>
-                <a:effectLst/>
-                <a:latin typeface="Arial" panose="020B0604020202020204" pitchFamily="34" charset="0"/>
+            <a:r>
+              <a:rPr lang="en-US" b="1" u="sng" dirty="0">
+                <a:latin typeface="Courier New" panose="02070309020205020404" pitchFamily="49" charset="0"/>
+                <a:cs typeface="Courier New" panose="02070309020205020404" pitchFamily="49" charset="0"/>
               </a:rPr>
-            </a:br>
-            <a:endParaRPr kumimoji="0" lang="ru-RU" altLang="ru-RU" sz="1800" b="0" i="0" u="none" strike="noStrike" cap="none" normalizeH="0" baseline="0">
-              <a:ln>
-                <a:noFill/>
-              </a:ln>
-              <a:solidFill>
-                <a:schemeClr val="tx1"/>
-              </a:solidFill>
-              <a:effectLst/>
-              <a:latin typeface="Arial" panose="020B0604020202020204" pitchFamily="34" charset="0"/>
+              <a:t>Console:</a:t>
+            </a:r>
+          </a:p>
+          <a:p>
+            <a:r>
+              <a:rPr lang="en-US" dirty="0">
+                <a:latin typeface="Courier New" panose="02070309020205020404" pitchFamily="49" charset="0"/>
+                <a:cs typeface="Courier New" panose="02070309020205020404" pitchFamily="49" charset="0"/>
+              </a:rPr>
+              <a:t>Hello, world!</a:t>
+            </a:r>
+          </a:p>
+          <a:p>
+            <a:r>
+              <a:rPr lang="en-US" dirty="0">
+                <a:latin typeface="Courier New" panose="02070309020205020404" pitchFamily="49" charset="0"/>
+                <a:cs typeface="Courier New" panose="02070309020205020404" pitchFamily="49" charset="0"/>
+              </a:rPr>
+              <a:t>5</a:t>
+            </a:r>
+            <a:endParaRPr lang="ru-RU" dirty="0">
+              <a:latin typeface="Courier New" panose="02070309020205020404" pitchFamily="49" charset="0"/>
+              <a:cs typeface="Courier New" panose="02070309020205020404" pitchFamily="49" charset="0"/>
             </a:endParaRPr>
           </a:p>
         </p:txBody>
       </p:sp>
-      <p:sp>
-        <p:nvSpPr>
-          <p:cNvPr id="11" name="Rectangle 4">
-            <a:extLst>
-              <a:ext uri="{FF2B5EF4-FFF2-40B4-BE49-F238E27FC236}">
-                <a16:creationId xmlns:a16="http://schemas.microsoft.com/office/drawing/2014/main" id="{D3EBFF1F-B8C6-EBFA-06AC-3DB2BB39E0F7}"/>
-              </a:ext>
-            </a:extLst>
-          </p:cNvPr>
-          <p:cNvSpPr>
-            <a:spLocks noChangeArrowheads="1"/>
-          </p:cNvSpPr>
+      <p:pic>
+        <p:nvPicPr>
+          <p:cNvPr id="13" name="Рисунок 12">
+            <a:extLst>
+              <a:ext uri="{FF2B5EF4-FFF2-40B4-BE49-F238E27FC236}">
+                <a16:creationId xmlns:a16="http://schemas.microsoft.com/office/drawing/2014/main" id="{37873B28-A062-D5BC-77CB-88B1E0CFF367}"/>
+              </a:ext>
+            </a:extLst>
+          </p:cNvPr>
+          <p:cNvPicPr>
+            <a:picLocks noChangeAspect="1"/>
+          </p:cNvPicPr>
           <p:nvPr/>
-        </p:nvSpPr>
-        <p:spPr bwMode="auto">
+        </p:nvPicPr>
+        <p:blipFill>
+          <a:blip r:embed="rId2"/>
+          <a:stretch>
+            <a:fillRect/>
+          </a:stretch>
+        </p:blipFill>
+        <p:spPr>
           <a:xfrm>
-            <a:off x="1787325" y="3601562"/>
-            <a:ext cx="12192000" cy="0"/>
+            <a:off x="6531980" y="1439100"/>
+            <a:ext cx="5383454" cy="3518135"/>
           </a:xfrm>
           <a:prstGeom prst="rect">
             <a:avLst/>
           </a:prstGeom>
-          <a:noFill/>
-          <a:ln>
-            <a:noFill/>
-          </a:ln>
-          <a:effectLst/>
-          <a:extLst>
-            <a:ext uri="{909E8E84-426E-40DD-AFC4-6F175D3DCCD1}">
-              <a14:hiddenFill xmlns:a14="http://schemas.microsoft.com/office/drawing/2010/main">
-                <a:solidFill>
-                  <a:schemeClr val="accent1"/>
-                </a:solidFill>
-              </a14:hiddenFill>
-            </a:ext>
-            <a:ext uri="{91240B29-F687-4F45-9708-019B960494DF}">
-              <a14:hiddenLine xmlns:a14="http://schemas.microsoft.com/office/drawing/2010/main" w="9525">
-                <a:solidFill>
-                  <a:schemeClr val="tx1"/>
-                </a:solidFill>
-                <a:miter lim="800000"/>
-                <a:headEnd/>
-                <a:tailEnd/>
-              </a14:hiddenLine>
-            </a:ext>
-            <a:ext uri="{AF507438-7753-43E0-B8FC-AC1667EBCBE1}">
-              <a14:hiddenEffects xmlns:a14="http://schemas.microsoft.com/office/drawing/2010/main">
-                <a:effectLst>
-                  <a:outerShdw dist="35921" dir="2700000" algn="ctr" rotWithShape="0">
-                    <a:schemeClr val="bg2"/>
-                  </a:outerShdw>
-                </a:effectLst>
-              </a14:hiddenEffects>
-            </a:ext>
-          </a:extLst>
         </p:spPr>
-        <p:txBody>
-          <a:bodyPr vert="horz" wrap="none" lIns="91440" tIns="45720" rIns="91440" bIns="45720" numCol="1" anchor="ctr" anchorCtr="0" compatLnSpc="1">
-            <a:prstTxWarp prst="textNoShape">
-              <a:avLst/>
-            </a:prstTxWarp>
-            <a:spAutoFit/>
-          </a:bodyPr>
-          <a:lstStyle/>
-          <a:p>
-            <a:pPr marL="0" marR="0" lvl="0" indent="0" algn="l" defTabSz="914400" rtl="0" eaLnBrk="0" fontAlgn="base" latinLnBrk="0" hangingPunct="0">
-              <a:lnSpc>
-                <a:spcPct val="100000"/>
-              </a:lnSpc>
-              <a:spcBef>
-                <a:spcPct val="0"/>
-              </a:spcBef>
-              <a:spcAft>
-                <a:spcPct val="0"/>
-              </a:spcAft>
-              <a:buClrTx/>
-              <a:buSzTx/>
-              <a:buFontTx/>
-              <a:buNone/>
-              <a:tabLst/>
-            </a:pPr>
-            <a:br>
-              <a:rPr kumimoji="0" lang="ru-RU" altLang="ru-RU" sz="1800" b="0" i="0" u="none" strike="noStrike" cap="none" normalizeH="0" baseline="0">
-                <a:ln>
-                  <a:noFill/>
-                </a:ln>
-                <a:solidFill>
-                  <a:schemeClr val="tx1"/>
-                </a:solidFill>
-                <a:effectLst/>
-                <a:latin typeface="Arial" panose="020B0604020202020204" pitchFamily="34" charset="0"/>
-              </a:rPr>
-            </a:br>
-            <a:endParaRPr kumimoji="0" lang="ru-RU" altLang="ru-RU" sz="1800" b="0" i="0" u="none" strike="noStrike" cap="none" normalizeH="0" baseline="0">
-              <a:ln>
-                <a:noFill/>
-              </a:ln>
-              <a:solidFill>
-                <a:schemeClr val="tx1"/>
-              </a:solidFill>
-              <a:effectLst/>
-              <a:latin typeface="Arial" panose="020B0604020202020204" pitchFamily="34" charset="0"/>
-            </a:endParaRPr>
-          </a:p>
-        </p:txBody>
-      </p:sp>
+      </p:pic>
     </p:spTree>
     <p:extLst>
       <p:ext uri="{BB962C8B-B14F-4D97-AF65-F5344CB8AC3E}">
-        <p14:creationId xmlns:p14="http://schemas.microsoft.com/office/powerpoint/2010/main" val="180512621"/>
+        <p14:creationId xmlns:p14="http://schemas.microsoft.com/office/powerpoint/2010/main" val="2295334937"/>
       </p:ext>
     </p:extLst>
   </p:cSld>
@@ -4678,10 +5219,10 @@
       </p:grpSpPr>
       <p:sp>
         <p:nvSpPr>
-          <p:cNvPr id="2" name="Заголовок 1">
-            <a:extLst>
-              <a:ext uri="{FF2B5EF4-FFF2-40B4-BE49-F238E27FC236}">
-                <a16:creationId xmlns:a16="http://schemas.microsoft.com/office/drawing/2014/main" id="{5930A688-2938-F6F9-9A6C-83DB7DF639D9}"/>
+          <p:cNvPr id="4" name="Заголовок 3">
+            <a:extLst>
+              <a:ext uri="{FF2B5EF4-FFF2-40B4-BE49-F238E27FC236}">
+                <a16:creationId xmlns:a16="http://schemas.microsoft.com/office/drawing/2014/main" id="{CE228031-626F-2E9C-A281-6879BD35A796}"/>
               </a:ext>
             </a:extLst>
           </p:cNvPr>
@@ -4698,19 +5239,26 @@
           <a:lstStyle/>
           <a:p>
             <a:r>
+              <a:rPr lang="ru-RU" dirty="0"/>
+              <a:t>Входные данные (</a:t>
+            </a:r>
+            <a:r>
               <a:rPr lang="en-US" dirty="0"/>
-              <a:t>Docker</a:t>
-            </a:r>
-            <a:endParaRPr lang="ru-RU" dirty="0"/>
-          </a:p>
-        </p:txBody>
-      </p:sp>
-      <p:sp>
-        <p:nvSpPr>
-          <p:cNvPr id="3" name="Объект 2">
-            <a:extLst>
-              <a:ext uri="{FF2B5EF4-FFF2-40B4-BE49-F238E27FC236}">
-                <a16:creationId xmlns:a16="http://schemas.microsoft.com/office/drawing/2014/main" id="{24FD7FC9-AE8A-5E8A-2396-C1007319488A}"/>
+              <a:t>1/2</a:t>
+            </a:r>
+            <a:r>
+              <a:rPr lang="ru-RU" dirty="0"/>
+              <a:t>)</a:t>
+            </a:r>
+          </a:p>
+        </p:txBody>
+      </p:sp>
+      <p:sp>
+        <p:nvSpPr>
+          <p:cNvPr id="5" name="Объект 4">
+            <a:extLst>
+              <a:ext uri="{FF2B5EF4-FFF2-40B4-BE49-F238E27FC236}">
+                <a16:creationId xmlns:a16="http://schemas.microsoft.com/office/drawing/2014/main" id="{92B99C8A-AB97-793A-D096-FF305BB9F53D}"/>
               </a:ext>
             </a:extLst>
           </p:cNvPr>
@@ -4721,402 +5269,216 @@
             <p:ph idx="1"/>
           </p:nvPr>
         </p:nvSpPr>
-        <p:spPr/>
-        <p:txBody>
-          <a:bodyPr/>
-          <a:lstStyle/>
-          <a:p>
-            <a:r>
-              <a:rPr lang="en-US" dirty="0" err="1"/>
-              <a:t>Dockerfile</a:t>
-            </a:r>
-            <a:endParaRPr lang="en-US" dirty="0"/>
-          </a:p>
-          <a:p>
-            <a:pPr lvl="1"/>
-            <a:r>
-              <a:rPr lang="en-US" sz="1800" b="0" i="0" u="none" strike="noStrike" dirty="0">
+        <p:spPr>
+          <a:xfrm>
+            <a:off x="734008" y="1438486"/>
+            <a:ext cx="5361992" cy="4631904"/>
+          </a:xfrm>
+        </p:spPr>
+        <p:txBody>
+          <a:bodyPr>
+            <a:normAutofit/>
+          </a:bodyPr>
+          <a:lstStyle/>
+          <a:p>
+            <a:r>
+              <a:rPr lang="ru-RU" dirty="0"/>
+              <a:t>Явное объявление типов параметров </a:t>
+            </a:r>
+            <a:r>
+              <a:rPr lang="ru-RU" dirty="0">
                 <a:solidFill>
-                  <a:srgbClr val="AA0D91"/>
+                  <a:schemeClr val="accent1"/>
                 </a:solidFill>
-                <a:effectLst/>
-                <a:latin typeface="Consolas" panose="020B0609020204030204" pitchFamily="49" charset="0"/>
               </a:rPr>
-              <a:t>FROM</a:t>
-            </a:r>
-            <a:r>
-              <a:rPr lang="en-US" sz="1800" b="0" i="0" u="none" strike="noStrike" dirty="0">
-                <a:solidFill>
-                  <a:srgbClr val="000000"/>
-                </a:solidFill>
-                <a:effectLst/>
-                <a:latin typeface="Consolas" panose="020B0609020204030204" pitchFamily="49" charset="0"/>
-              </a:rPr>
-              <a:t> </a:t>
-            </a:r>
-            <a:r>
-              <a:rPr lang="en-US" sz="1800" b="0" i="0" u="none" strike="noStrike" dirty="0" err="1">
-                <a:solidFill>
-                  <a:srgbClr val="000000"/>
-                </a:solidFill>
-                <a:effectLst/>
-                <a:latin typeface="Consolas" panose="020B0609020204030204" pitchFamily="49" charset="0"/>
-              </a:rPr>
-              <a:t>rust:latest</a:t>
-            </a:r>
-            <a:br>
-              <a:rPr lang="en-US" sz="1800" b="0" i="0" u="none" strike="noStrike" dirty="0">
-                <a:solidFill>
-                  <a:srgbClr val="000000"/>
-                </a:solidFill>
-                <a:effectLst/>
-                <a:latin typeface="Consolas" panose="020B0609020204030204" pitchFamily="49" charset="0"/>
-              </a:rPr>
-            </a:br>
-            <a:br>
-              <a:rPr lang="en-US" sz="1800" b="0" i="0" u="none" strike="noStrike" dirty="0">
-                <a:solidFill>
-                  <a:srgbClr val="000000"/>
-                </a:solidFill>
-                <a:effectLst/>
-                <a:latin typeface="Consolas" panose="020B0609020204030204" pitchFamily="49" charset="0"/>
-              </a:rPr>
-            </a:br>
-            <a:r>
-              <a:rPr lang="en-US" sz="1800" b="0" i="0" u="none" strike="noStrike" dirty="0">
-                <a:solidFill>
-                  <a:srgbClr val="AA0D91"/>
-                </a:solidFill>
-                <a:effectLst/>
-                <a:latin typeface="Consolas" panose="020B0609020204030204" pitchFamily="49" charset="0"/>
-              </a:rPr>
-              <a:t>WORKDIR</a:t>
-            </a:r>
-            <a:r>
-              <a:rPr lang="en-US" sz="1800" b="0" i="0" u="none" strike="noStrike" dirty="0">
-                <a:solidFill>
-                  <a:srgbClr val="000000"/>
-                </a:solidFill>
-                <a:effectLst/>
-                <a:latin typeface="Consolas" panose="020B0609020204030204" pitchFamily="49" charset="0"/>
-              </a:rPr>
-              <a:t> /app</a:t>
-            </a:r>
-            <a:br>
-              <a:rPr lang="en-US" sz="1800" b="0" i="0" u="none" strike="noStrike" dirty="0">
-                <a:solidFill>
-                  <a:srgbClr val="000000"/>
-                </a:solidFill>
-                <a:effectLst/>
-                <a:latin typeface="Consolas" panose="020B0609020204030204" pitchFamily="49" charset="0"/>
-              </a:rPr>
-            </a:br>
-            <a:r>
-              <a:rPr lang="en-US" sz="1800" b="0" i="0" u="none" strike="noStrike" dirty="0">
-                <a:solidFill>
-                  <a:srgbClr val="AA0D91"/>
-                </a:solidFill>
-                <a:effectLst/>
-                <a:latin typeface="Consolas" panose="020B0609020204030204" pitchFamily="49" charset="0"/>
-              </a:rPr>
-              <a:t>COPY</a:t>
-            </a:r>
-            <a:r>
-              <a:rPr lang="en-US" sz="1800" b="0" i="0" u="none" strike="noStrike" dirty="0">
-                <a:solidFill>
-                  <a:srgbClr val="000000"/>
-                </a:solidFill>
-                <a:effectLst/>
-                <a:latin typeface="Consolas" panose="020B0609020204030204" pitchFamily="49" charset="0"/>
-              </a:rPr>
-              <a:t> ./</a:t>
-            </a:r>
-            <a:r>
-              <a:rPr lang="en-US" sz="1800" b="0" i="0" u="none" strike="noStrike" dirty="0" err="1">
-                <a:solidFill>
-                  <a:srgbClr val="000000"/>
-                </a:solidFill>
-                <a:effectLst/>
-                <a:latin typeface="Consolas" panose="020B0609020204030204" pitchFamily="49" charset="0"/>
-              </a:rPr>
-              <a:t>Cargo.toml</a:t>
-            </a:r>
-            <a:r>
-              <a:rPr lang="en-US" sz="1800" b="0" i="0" u="none" strike="noStrike" dirty="0">
-                <a:solidFill>
-                  <a:srgbClr val="000000"/>
-                </a:solidFill>
-                <a:effectLst/>
-                <a:latin typeface="Consolas" panose="020B0609020204030204" pitchFamily="49" charset="0"/>
-              </a:rPr>
-              <a:t> ./</a:t>
-            </a:r>
-            <a:r>
-              <a:rPr lang="en-US" sz="1800" b="0" i="0" u="none" strike="noStrike" dirty="0" err="1">
-                <a:solidFill>
-                  <a:srgbClr val="000000"/>
-                </a:solidFill>
-                <a:effectLst/>
-                <a:latin typeface="Consolas" panose="020B0609020204030204" pitchFamily="49" charset="0"/>
-              </a:rPr>
-              <a:t>Cargo.lock</a:t>
-            </a:r>
-            <a:r>
-              <a:rPr lang="en-US" sz="1800" b="0" i="0" u="none" strike="noStrike" dirty="0">
-                <a:solidFill>
-                  <a:srgbClr val="000000"/>
-                </a:solidFill>
-                <a:effectLst/>
-                <a:latin typeface="Consolas" panose="020B0609020204030204" pitchFamily="49" charset="0"/>
-              </a:rPr>
-              <a:t> ./</a:t>
-            </a:r>
-            <a:br>
-              <a:rPr lang="en-US" sz="1800" b="0" i="0" u="none" strike="noStrike" dirty="0">
-                <a:solidFill>
-                  <a:srgbClr val="000000"/>
-                </a:solidFill>
-                <a:effectLst/>
-                <a:latin typeface="Consolas" panose="020B0609020204030204" pitchFamily="49" charset="0"/>
-              </a:rPr>
-            </a:br>
-            <a:r>
-              <a:rPr lang="en-US" sz="1800" b="0" i="0" u="none" strike="noStrike" dirty="0">
-                <a:solidFill>
-                  <a:srgbClr val="AA0D91"/>
-                </a:solidFill>
-                <a:effectLst/>
-                <a:latin typeface="Consolas" panose="020B0609020204030204" pitchFamily="49" charset="0"/>
-              </a:rPr>
-              <a:t>COPY</a:t>
-            </a:r>
-            <a:r>
-              <a:rPr lang="en-US" sz="1800" b="0" i="0" u="none" strike="noStrike" dirty="0">
-                <a:solidFill>
-                  <a:srgbClr val="000000"/>
-                </a:solidFill>
-                <a:effectLst/>
-                <a:latin typeface="Consolas" panose="020B0609020204030204" pitchFamily="49" charset="0"/>
-              </a:rPr>
-              <a:t> ./</a:t>
-            </a:r>
-            <a:r>
-              <a:rPr lang="en-US" sz="1800" b="0" i="0" u="none" strike="noStrike" dirty="0" err="1">
-                <a:solidFill>
-                  <a:srgbClr val="000000"/>
-                </a:solidFill>
-                <a:effectLst/>
-                <a:latin typeface="Consolas" panose="020B0609020204030204" pitchFamily="49" charset="0"/>
-              </a:rPr>
-              <a:t>src</a:t>
-            </a:r>
-            <a:r>
-              <a:rPr lang="en-US" sz="1800" b="0" i="0" u="none" strike="noStrike" dirty="0">
-                <a:solidFill>
-                  <a:srgbClr val="000000"/>
-                </a:solidFill>
-                <a:effectLst/>
-                <a:latin typeface="Consolas" panose="020B0609020204030204" pitchFamily="49" charset="0"/>
-              </a:rPr>
-              <a:t> ./</a:t>
-            </a:r>
-            <a:r>
-              <a:rPr lang="en-US" sz="1800" b="0" i="0" u="none" strike="noStrike" dirty="0" err="1">
-                <a:solidFill>
-                  <a:srgbClr val="000000"/>
-                </a:solidFill>
-                <a:effectLst/>
-                <a:latin typeface="Consolas" panose="020B0609020204030204" pitchFamily="49" charset="0"/>
-              </a:rPr>
-              <a:t>src</a:t>
-            </a:r>
-            <a:br>
-              <a:rPr lang="en-US" sz="1800" b="0" i="0" u="none" strike="noStrike" dirty="0">
-                <a:solidFill>
-                  <a:srgbClr val="000000"/>
-                </a:solidFill>
-                <a:effectLst/>
-                <a:latin typeface="Consolas" panose="020B0609020204030204" pitchFamily="49" charset="0"/>
-              </a:rPr>
-            </a:br>
-            <a:br>
-              <a:rPr lang="en-US" sz="1800" b="0" i="0" u="none" strike="noStrike" dirty="0">
-                <a:solidFill>
-                  <a:srgbClr val="000000"/>
-                </a:solidFill>
-                <a:effectLst/>
-                <a:latin typeface="Consolas" panose="020B0609020204030204" pitchFamily="49" charset="0"/>
-              </a:rPr>
-            </a:br>
-            <a:r>
-              <a:rPr lang="en-US" sz="1800" b="0" i="0" u="none" strike="noStrike" dirty="0">
-                <a:solidFill>
-                  <a:srgbClr val="AA0D91"/>
-                </a:solidFill>
-                <a:effectLst/>
-                <a:latin typeface="Consolas" panose="020B0609020204030204" pitchFamily="49" charset="0"/>
-              </a:rPr>
-              <a:t>RUN</a:t>
-            </a:r>
-            <a:r>
-              <a:rPr lang="en-US" sz="1800" b="0" i="0" u="none" strike="noStrike" dirty="0">
-                <a:solidFill>
-                  <a:srgbClr val="000000"/>
-                </a:solidFill>
-                <a:effectLst/>
-                <a:latin typeface="Consolas" panose="020B0609020204030204" pitchFamily="49" charset="0"/>
-              </a:rPr>
-              <a:t> cargo build --release</a:t>
-            </a:r>
-            <a:br>
-              <a:rPr lang="en-US" sz="1800" b="0" i="0" u="none" strike="noStrike" dirty="0">
-                <a:solidFill>
-                  <a:srgbClr val="000000"/>
-                </a:solidFill>
-                <a:effectLst/>
-                <a:latin typeface="Consolas" panose="020B0609020204030204" pitchFamily="49" charset="0"/>
-              </a:rPr>
-            </a:br>
-            <a:r>
-              <a:rPr lang="en-US" sz="1800" b="0" i="0" u="none" strike="noStrike" dirty="0">
-                <a:solidFill>
-                  <a:srgbClr val="AA0D91"/>
-                </a:solidFill>
-                <a:effectLst/>
-                <a:latin typeface="Consolas" panose="020B0609020204030204" pitchFamily="49" charset="0"/>
-              </a:rPr>
-              <a:t>CMD</a:t>
-            </a:r>
-            <a:r>
-              <a:rPr lang="en-US" sz="1800" b="0" i="0" u="none" strike="noStrike" dirty="0">
-                <a:solidFill>
-                  <a:srgbClr val="000000"/>
-                </a:solidFill>
-                <a:effectLst/>
-                <a:latin typeface="Consolas" panose="020B0609020204030204" pitchFamily="49" charset="0"/>
-              </a:rPr>
-              <a:t> [</a:t>
-            </a:r>
-            <a:r>
-              <a:rPr lang="en-US" sz="1800" b="0" i="0" u="none" strike="noStrike" dirty="0">
-                <a:solidFill>
-                  <a:srgbClr val="C41A16"/>
-                </a:solidFill>
-                <a:effectLst/>
-                <a:latin typeface="Consolas" panose="020B0609020204030204" pitchFamily="49" charset="0"/>
-              </a:rPr>
-              <a:t>"./target/release/</a:t>
-            </a:r>
-            <a:r>
-              <a:rPr lang="en-US" sz="1800" b="0" i="0" u="none" strike="noStrike" dirty="0" err="1">
-                <a:solidFill>
-                  <a:srgbClr val="C41A16"/>
-                </a:solidFill>
-                <a:effectLst/>
-                <a:latin typeface="Consolas" panose="020B0609020204030204" pitchFamily="49" charset="0"/>
-              </a:rPr>
-              <a:t>hello_world</a:t>
-            </a:r>
-            <a:r>
-              <a:rPr lang="en-US" sz="1800" b="0" i="0" u="none" strike="noStrike" dirty="0">
-                <a:solidFill>
-                  <a:srgbClr val="C41A16"/>
-                </a:solidFill>
-                <a:effectLst/>
-                <a:latin typeface="Consolas" panose="020B0609020204030204" pitchFamily="49" charset="0"/>
-              </a:rPr>
-              <a:t>"</a:t>
-            </a:r>
-            <a:r>
-              <a:rPr lang="en-US" sz="1800" b="0" i="0" u="none" strike="noStrike" dirty="0">
-                <a:solidFill>
-                  <a:srgbClr val="000000"/>
-                </a:solidFill>
-                <a:effectLst/>
-                <a:latin typeface="Consolas" panose="020B0609020204030204" pitchFamily="49" charset="0"/>
-              </a:rPr>
-              <a:t>]</a:t>
-            </a:r>
-          </a:p>
-          <a:p>
+              <a:t>необходимо</a:t>
+            </a:r>
+            <a:r>
+              <a:rPr lang="ru-RU" dirty="0"/>
+              <a:t>. </a:t>
+            </a:r>
+          </a:p>
+          <a:p>
+            <a:r>
+              <a:rPr lang="ru-RU" dirty="0"/>
+              <a:t>Передача осуществляется либо по изменяемой/не изменяемой ссылке, либо по значению, либо по </a:t>
+            </a:r>
+            <a:r>
+              <a:rPr lang="ru-RU" u="sng" dirty="0"/>
+              <a:t>скопированному значению</a:t>
+            </a:r>
+            <a:r>
+              <a:rPr lang="en-US" i="1" dirty="0"/>
+              <a:t>.</a:t>
+            </a:r>
+            <a:endParaRPr lang="ru-RU" i="1" dirty="0"/>
+          </a:p>
+          <a:p>
+            <a:r>
+              <a:rPr lang="ru-RU" dirty="0"/>
+              <a:t>Целочисленные типы(</a:t>
+            </a:r>
             <a:r>
               <a:rPr lang="en-US" dirty="0">
                 <a:solidFill>
-                  <a:srgbClr val="000000"/>
+                  <a:schemeClr val="accent1"/>
                 </a:solidFill>
               </a:rPr>
-              <a:t>Docker commands</a:t>
-            </a:r>
-          </a:p>
-          <a:p>
-            <a:pPr lvl="1"/>
-            <a:r>
-              <a:rPr lang="en-US" sz="1800" b="0" i="0" u="none" strike="noStrike" dirty="0">
+              <a:t>i32</a:t>
+            </a:r>
+            <a:r>
+              <a:rPr lang="en-US" dirty="0"/>
+              <a:t>, </a:t>
+            </a:r>
+            <a:r>
+              <a:rPr lang="en-US" dirty="0">
                 <a:solidFill>
-                  <a:srgbClr val="000000"/>
+                  <a:schemeClr val="accent1"/>
                 </a:solidFill>
-                <a:effectLst/>
-                <a:latin typeface="Consolas" panose="020B0609020204030204" pitchFamily="49" charset="0"/>
               </a:rPr>
-              <a:t>docker build -t </a:t>
-            </a:r>
-            <a:r>
-              <a:rPr lang="en-US" sz="1800" b="0" i="0" u="none" strike="noStrike" dirty="0" err="1">
-                <a:solidFill>
-                  <a:srgbClr val="000000"/>
-                </a:solidFill>
-                <a:effectLst/>
-                <a:latin typeface="Consolas" panose="020B0609020204030204" pitchFamily="49" charset="0"/>
+              <a:t>u32</a:t>
+            </a:r>
+            <a:r>
+              <a:rPr lang="en-US" dirty="0"/>
+              <a:t>,…)</a:t>
+            </a:r>
+            <a:r>
+              <a:rPr lang="ru-RU" dirty="0"/>
+              <a:t> реализуют свойства копирования.</a:t>
+            </a:r>
+          </a:p>
+        </p:txBody>
+      </p:sp>
+      <p:sp>
+        <p:nvSpPr>
+          <p:cNvPr id="2" name="TextBox 1">
+            <a:extLst>
+              <a:ext uri="{FF2B5EF4-FFF2-40B4-BE49-F238E27FC236}">
+                <a16:creationId xmlns:a16="http://schemas.microsoft.com/office/drawing/2014/main" id="{8A841D9B-A2F7-4570-BE2E-B01741B6EEDB}"/>
+              </a:ext>
+            </a:extLst>
+          </p:cNvPr>
+          <p:cNvSpPr txBox="1"/>
+          <p:nvPr/>
+        </p:nvSpPr>
+        <p:spPr>
+          <a:xfrm>
+            <a:off x="3293201" y="5042118"/>
+            <a:ext cx="3493264" cy="1815882"/>
+          </a:xfrm>
+          <a:prstGeom prst="rect">
+            <a:avLst/>
+          </a:prstGeom>
+          <a:noFill/>
+        </p:spPr>
+        <p:txBody>
+          <a:bodyPr wrap="square" rtlCol="0">
+            <a:spAutoFit/>
+          </a:bodyPr>
+          <a:lstStyle/>
+          <a:p>
+            <a:r>
+              <a:rPr lang="en-US" sz="1600" b="1" u="sng" dirty="0">
+                <a:latin typeface="Courier New" panose="02070309020205020404" pitchFamily="49" charset="0"/>
+                <a:cs typeface="Courier New" panose="02070309020205020404" pitchFamily="49" charset="0"/>
               </a:rPr>
-              <a:t>hello_world_image</a:t>
-            </a:r>
-            <a:r>
-              <a:rPr lang="en-US" sz="1800" b="0" i="0" u="none" strike="noStrike" dirty="0">
-                <a:solidFill>
-                  <a:srgbClr val="000000"/>
-                </a:solidFill>
-                <a:effectLst/>
-                <a:latin typeface="Consolas" panose="020B0609020204030204" pitchFamily="49" charset="0"/>
+              <a:t>Console:</a:t>
+            </a:r>
+          </a:p>
+          <a:p>
+            <a:r>
+              <a:rPr lang="en-US" sz="1600" dirty="0">
+                <a:latin typeface="Courier New" panose="02070309020205020404" pitchFamily="49" charset="0"/>
+                <a:cs typeface="Courier New" panose="02070309020205020404" pitchFamily="49" charset="0"/>
               </a:rPr>
-              <a:t> .</a:t>
-            </a:r>
-            <a:br>
-              <a:rPr lang="en-US" sz="1800" b="0" i="0" u="none" strike="noStrike" dirty="0">
-                <a:solidFill>
-                  <a:srgbClr val="000000"/>
-                </a:solidFill>
-                <a:effectLst/>
-                <a:latin typeface="Consolas" panose="020B0609020204030204" pitchFamily="49" charset="0"/>
+              <a:t>take_by_value: x = 5</a:t>
+            </a:r>
+          </a:p>
+          <a:p>
+            <a:r>
+              <a:rPr lang="en-US" sz="1600" dirty="0">
+                <a:latin typeface="Courier New" panose="02070309020205020404" pitchFamily="49" charset="0"/>
+                <a:cs typeface="Courier New" panose="02070309020205020404" pitchFamily="49" charset="0"/>
               </a:rPr>
-            </a:br>
-            <a:r>
-              <a:rPr lang="en-US" sz="1800" b="0" i="0" u="none" strike="noStrike" dirty="0">
-                <a:solidFill>
-                  <a:srgbClr val="000000"/>
-                </a:solidFill>
-                <a:effectLst/>
-                <a:latin typeface="Consolas" panose="020B0609020204030204" pitchFamily="49" charset="0"/>
+              <a:t>Main: num = 5</a:t>
+            </a:r>
+          </a:p>
+          <a:p>
+            <a:r>
+              <a:rPr lang="en-US" sz="1600" dirty="0">
+                <a:latin typeface="Courier New" panose="02070309020205020404" pitchFamily="49" charset="0"/>
+                <a:cs typeface="Courier New" panose="02070309020205020404" pitchFamily="49" charset="0"/>
               </a:rPr>
-              <a:t>docker run </a:t>
-            </a:r>
-            <a:r>
-              <a:rPr lang="en-US" sz="1800" b="0" i="0" u="none" strike="noStrike" dirty="0" err="1">
-                <a:solidFill>
-                  <a:srgbClr val="000000"/>
-                </a:solidFill>
-                <a:effectLst/>
-                <a:latin typeface="Consolas" panose="020B0609020204030204" pitchFamily="49" charset="0"/>
+              <a:t>modify_by_value: x = 6</a:t>
+            </a:r>
+          </a:p>
+          <a:p>
+            <a:r>
+              <a:rPr lang="en-US" sz="1600" dirty="0">
+                <a:latin typeface="Courier New" panose="02070309020205020404" pitchFamily="49" charset="0"/>
+                <a:cs typeface="Courier New" panose="02070309020205020404" pitchFamily="49" charset="0"/>
               </a:rPr>
-              <a:t>hello_world_image</a:t>
-            </a:r>
-            <a:endParaRPr lang="ru-RU" dirty="0"/>
-          </a:p>
-        </p:txBody>
-      </p:sp>
+              <a:t>Main: num = 5</a:t>
+            </a:r>
+          </a:p>
+          <a:p>
+            <a:r>
+              <a:rPr lang="en-US" sz="1600" dirty="0">
+                <a:latin typeface="Courier New" panose="02070309020205020404" pitchFamily="49" charset="0"/>
+                <a:cs typeface="Courier New" panose="02070309020205020404" pitchFamily="49" charset="0"/>
+              </a:rPr>
+              <a:t>modify_by_reference: x = 6</a:t>
+            </a:r>
+          </a:p>
+          <a:p>
+            <a:r>
+              <a:rPr lang="en-US" sz="1600" dirty="0">
+                <a:latin typeface="Courier New" panose="02070309020205020404" pitchFamily="49" charset="0"/>
+                <a:cs typeface="Courier New" panose="02070309020205020404" pitchFamily="49" charset="0"/>
+              </a:rPr>
+              <a:t>Main: num = 6</a:t>
+            </a:r>
+            <a:endParaRPr lang="ru-RU" sz="1600" dirty="0">
+              <a:latin typeface="Courier New" panose="02070309020205020404" pitchFamily="49" charset="0"/>
+              <a:cs typeface="Courier New" panose="02070309020205020404" pitchFamily="49" charset="0"/>
+            </a:endParaRPr>
+          </a:p>
+        </p:txBody>
+      </p:sp>
+      <p:pic>
+        <p:nvPicPr>
+          <p:cNvPr id="8" name="Рисунок 7">
+            <a:extLst>
+              <a:ext uri="{FF2B5EF4-FFF2-40B4-BE49-F238E27FC236}">
+                <a16:creationId xmlns:a16="http://schemas.microsoft.com/office/drawing/2014/main" id="{1B2CF447-0AB7-2BEF-31A4-9D57DE2FBBC3}"/>
+              </a:ext>
+            </a:extLst>
+          </p:cNvPr>
+          <p:cNvPicPr>
+            <a:picLocks noChangeAspect="1"/>
+          </p:cNvPicPr>
+          <p:nvPr/>
+        </p:nvPicPr>
+        <p:blipFill>
+          <a:blip r:embed="rId2"/>
+          <a:stretch>
+            <a:fillRect/>
+          </a:stretch>
+        </p:blipFill>
+        <p:spPr>
+          <a:xfrm>
+            <a:off x="6595184" y="1438486"/>
+            <a:ext cx="5208040" cy="5247949"/>
+          </a:xfrm>
+          <a:prstGeom prst="rect">
+            <a:avLst/>
+          </a:prstGeom>
+        </p:spPr>
+      </p:pic>
     </p:spTree>
     <p:extLst>
       <p:ext uri="{BB962C8B-B14F-4D97-AF65-F5344CB8AC3E}">
-        <p14:creationId xmlns:p14="http://schemas.microsoft.com/office/powerpoint/2010/main" val="826847264"/>
+        <p14:creationId xmlns:p14="http://schemas.microsoft.com/office/powerpoint/2010/main" val="2904243516"/>
       </p:ext>
     </p:extLst>
   </p:cSld>
@@ -5145,10 +5507,10 @@
       </p:grpSpPr>
       <p:sp>
         <p:nvSpPr>
-          <p:cNvPr id="2" name="Заголовок 1">
-            <a:extLst>
-              <a:ext uri="{FF2B5EF4-FFF2-40B4-BE49-F238E27FC236}">
-                <a16:creationId xmlns:a16="http://schemas.microsoft.com/office/drawing/2014/main" id="{3B020788-B501-7844-AD7D-77D64EB0C490}"/>
+          <p:cNvPr id="4" name="Заголовок 3">
+            <a:extLst>
+              <a:ext uri="{FF2B5EF4-FFF2-40B4-BE49-F238E27FC236}">
+                <a16:creationId xmlns:a16="http://schemas.microsoft.com/office/drawing/2014/main" id="{CE228031-626F-2E9C-A281-6879BD35A796}"/>
               </a:ext>
             </a:extLst>
           </p:cNvPr>
@@ -5166,17 +5528,25 @@
           <a:p>
             <a:r>
               <a:rPr lang="ru-RU" dirty="0"/>
-              <a:t>Материалы</a:t>
-            </a:r>
-          </a:p>
-        </p:txBody>
-      </p:sp>
-      <p:sp>
-        <p:nvSpPr>
-          <p:cNvPr id="3" name="Объект 2">
-            <a:extLst>
-              <a:ext uri="{FF2B5EF4-FFF2-40B4-BE49-F238E27FC236}">
-                <a16:creationId xmlns:a16="http://schemas.microsoft.com/office/drawing/2014/main" id="{BB394B4C-631A-B81B-D635-9053F4A2107D}"/>
+              <a:t>Входные данные (</a:t>
+            </a:r>
+            <a:r>
+              <a:rPr lang="en-US" dirty="0"/>
+              <a:t>2/2</a:t>
+            </a:r>
+            <a:r>
+              <a:rPr lang="ru-RU" dirty="0"/>
+              <a:t>)</a:t>
+            </a:r>
+          </a:p>
+        </p:txBody>
+      </p:sp>
+      <p:sp>
+        <p:nvSpPr>
+          <p:cNvPr id="5" name="Объект 4">
+            <a:extLst>
+              <a:ext uri="{FF2B5EF4-FFF2-40B4-BE49-F238E27FC236}">
+                <a16:creationId xmlns:a16="http://schemas.microsoft.com/office/drawing/2014/main" id="{92B99C8A-AB97-793A-D096-FF305BB9F53D}"/>
               </a:ext>
             </a:extLst>
           </p:cNvPr>
@@ -5187,39 +5557,163 @@
             <p:ph idx="1"/>
           </p:nvPr>
         </p:nvSpPr>
-        <p:spPr/>
-        <p:txBody>
-          <a:bodyPr/>
-          <a:lstStyle/>
-          <a:p>
-            <a:r>
-              <a:rPr lang="ru-RU" dirty="0"/>
-              <a:t>Официальная документация </a:t>
+        <p:spPr>
+          <a:xfrm>
+            <a:off x="1011592" y="1438486"/>
+            <a:ext cx="5410200" cy="4648994"/>
+          </a:xfrm>
+        </p:spPr>
+        <p:txBody>
+          <a:bodyPr>
+            <a:normAutofit/>
+          </a:bodyPr>
+          <a:lstStyle/>
+          <a:p>
+            <a:r>
+              <a:rPr lang="ru-RU" dirty="0"/>
+              <a:t>Другие типы (в том числе пользовательские) требуют передавать по ссылке.</a:t>
+            </a:r>
+            <a:endParaRPr lang="en-US" dirty="0"/>
+          </a:p>
+          <a:p>
+            <a:r>
+              <a:rPr lang="ru-RU" dirty="0"/>
+              <a:t>Для того чтобы изменять исходное значение нужно использовать </a:t>
             </a:r>
             <a:r>
               <a:rPr lang="en-US" dirty="0"/>
-              <a:t>Rust</a:t>
-            </a:r>
-          </a:p>
-          <a:p>
-            <a:pPr lvl="1"/>
-            <a:r>
-              <a:rPr lang="en-US" dirty="0">
-                <a:hlinkClick r:id="rId2"/>
+              <a:t>(</a:t>
+            </a:r>
+            <a:r>
+              <a:rPr lang="en-US" b="1" dirty="0">
+                <a:solidFill>
+                  <a:schemeClr val="accent1"/>
+                </a:solidFill>
+                <a:latin typeface="Courier New" panose="02070309020205020404" pitchFamily="49" charset="0"/>
+                <a:cs typeface="Courier New" panose="02070309020205020404" pitchFamily="49" charset="0"/>
               </a:rPr>
-              <a:t>https://doc.rust-lang.org/book/ch03-03-how-functions-work.html</a:t>
-            </a:r>
-            <a:endParaRPr lang="en-US" dirty="0"/>
-          </a:p>
-          <a:p>
-            <a:endParaRPr lang="en-US" dirty="0"/>
-          </a:p>
-        </p:txBody>
-      </p:sp>
+              <a:t>&amp;mut</a:t>
+            </a:r>
+            <a:r>
+              <a:rPr lang="en-US" dirty="0"/>
+              <a:t>)</a:t>
+            </a:r>
+            <a:endParaRPr lang="ru-RU" dirty="0"/>
+          </a:p>
+        </p:txBody>
+      </p:sp>
+      <p:sp>
+        <p:nvSpPr>
+          <p:cNvPr id="2" name="TextBox 1">
+            <a:extLst>
+              <a:ext uri="{FF2B5EF4-FFF2-40B4-BE49-F238E27FC236}">
+                <a16:creationId xmlns:a16="http://schemas.microsoft.com/office/drawing/2014/main" id="{8A841D9B-A2F7-4570-BE2E-B01741B6EEDB}"/>
+              </a:ext>
+            </a:extLst>
+          </p:cNvPr>
+          <p:cNvSpPr txBox="1"/>
+          <p:nvPr/>
+        </p:nvSpPr>
+        <p:spPr>
+          <a:xfrm>
+            <a:off x="6096000" y="5169436"/>
+            <a:ext cx="3493264" cy="1323439"/>
+          </a:xfrm>
+          <a:prstGeom prst="rect">
+            <a:avLst/>
+          </a:prstGeom>
+          <a:noFill/>
+        </p:spPr>
+        <p:txBody>
+          <a:bodyPr wrap="square" rtlCol="0">
+            <a:spAutoFit/>
+          </a:bodyPr>
+          <a:lstStyle/>
+          <a:p>
+            <a:r>
+              <a:rPr lang="en-US" sz="1600" u="sng" dirty="0">
+                <a:latin typeface="Courier New" panose="02070309020205020404" pitchFamily="49" charset="0"/>
+                <a:cs typeface="Courier New" panose="02070309020205020404" pitchFamily="49" charset="0"/>
+              </a:rPr>
+              <a:t>Console:</a:t>
+            </a:r>
+          </a:p>
+          <a:p>
+            <a:r>
+              <a:rPr lang="en-US" sz="1600" dirty="0">
+                <a:latin typeface="Courier New" panose="02070309020205020404" pitchFamily="49" charset="0"/>
+                <a:cs typeface="Courier New" panose="02070309020205020404" pitchFamily="49" charset="0"/>
+              </a:rPr>
+              <a:t>take_by_value: x = 6</a:t>
+            </a:r>
+          </a:p>
+          <a:p>
+            <a:r>
+              <a:rPr lang="en-US" sz="1600" dirty="0">
+                <a:latin typeface="Courier New" panose="02070309020205020404" pitchFamily="49" charset="0"/>
+                <a:cs typeface="Courier New" panose="02070309020205020404" pitchFamily="49" charset="0"/>
+              </a:rPr>
+              <a:t>Main: num = 5</a:t>
+            </a:r>
+          </a:p>
+          <a:p>
+            <a:r>
+              <a:rPr lang="en-US" sz="1600" dirty="0">
+                <a:latin typeface="Courier New" panose="02070309020205020404" pitchFamily="49" charset="0"/>
+                <a:cs typeface="Courier New" panose="02070309020205020404" pitchFamily="49" charset="0"/>
+              </a:rPr>
+              <a:t>take_by_reference: x = 6</a:t>
+            </a:r>
+          </a:p>
+          <a:p>
+            <a:r>
+              <a:rPr lang="en-US" sz="1600" dirty="0">
+                <a:latin typeface="Courier New" panose="02070309020205020404" pitchFamily="49" charset="0"/>
+                <a:cs typeface="Courier New" panose="02070309020205020404" pitchFamily="49" charset="0"/>
+              </a:rPr>
+              <a:t>Main: num = 6</a:t>
+            </a:r>
+            <a:endParaRPr lang="ru-RU" sz="1600" dirty="0">
+              <a:latin typeface="Courier New" panose="02070309020205020404" pitchFamily="49" charset="0"/>
+              <a:cs typeface="Courier New" panose="02070309020205020404" pitchFamily="49" charset="0"/>
+            </a:endParaRPr>
+          </a:p>
+        </p:txBody>
+      </p:sp>
+      <p:pic>
+        <p:nvPicPr>
+          <p:cNvPr id="11" name="Рисунок 10">
+            <a:extLst>
+              <a:ext uri="{FF2B5EF4-FFF2-40B4-BE49-F238E27FC236}">
+                <a16:creationId xmlns:a16="http://schemas.microsoft.com/office/drawing/2014/main" id="{FA439B42-6880-8385-109C-6E86B479D7E8}"/>
+              </a:ext>
+            </a:extLst>
+          </p:cNvPr>
+          <p:cNvPicPr>
+            <a:picLocks noChangeAspect="1"/>
+          </p:cNvPicPr>
+          <p:nvPr/>
+        </p:nvPicPr>
+        <p:blipFill>
+          <a:blip r:embed="rId2"/>
+          <a:stretch>
+            <a:fillRect/>
+          </a:stretch>
+        </p:blipFill>
+        <p:spPr>
+          <a:xfrm>
+            <a:off x="6096000" y="1438486"/>
+            <a:ext cx="5767493" cy="3502482"/>
+          </a:xfrm>
+          <a:prstGeom prst="rect">
+            <a:avLst/>
+          </a:prstGeom>
+        </p:spPr>
+      </p:pic>
     </p:spTree>
     <p:extLst>
       <p:ext uri="{BB962C8B-B14F-4D97-AF65-F5344CB8AC3E}">
-        <p14:creationId xmlns:p14="http://schemas.microsoft.com/office/powerpoint/2010/main" val="3793044585"/>
+        <p14:creationId xmlns:p14="http://schemas.microsoft.com/office/powerpoint/2010/main" val="2787100475"/>
       </p:ext>
     </p:extLst>
   </p:cSld>
@@ -5251,7 +5745,7 @@
           <p:cNvPr id="4" name="Заголовок 3">
             <a:extLst>
               <a:ext uri="{FF2B5EF4-FFF2-40B4-BE49-F238E27FC236}">
-                <a16:creationId xmlns:a16="http://schemas.microsoft.com/office/drawing/2014/main" id="{EBE47465-5303-012E-C087-D118187C7970}"/>
+                <a16:creationId xmlns:a16="http://schemas.microsoft.com/office/drawing/2014/main" id="{CE228031-626F-2E9C-A281-6879BD35A796}"/>
               </a:ext>
             </a:extLst>
           </p:cNvPr>
@@ -5260,12 +5754,49 @@
           </p:cNvSpPr>
           <p:nvPr>
             <p:ph type="title"/>
+          </p:nvPr>
+        </p:nvSpPr>
+        <p:spPr/>
+        <p:txBody>
+          <a:bodyPr/>
+          <a:lstStyle/>
+          <a:p>
+            <a:r>
+              <a:rPr lang="en-US" dirty="0"/>
+              <a:t>() – </a:t>
+            </a:r>
+            <a:r>
+              <a:rPr lang="ru-RU" dirty="0"/>
+              <a:t>«единица измерения»</a:t>
+            </a:r>
+            <a:r>
+              <a:rPr lang="en-US" dirty="0"/>
+              <a:t>(unit) (1/2)</a:t>
+            </a:r>
+            <a:endParaRPr lang="ru-RU" dirty="0"/>
+          </a:p>
+        </p:txBody>
+      </p:sp>
+      <p:sp>
+        <p:nvSpPr>
+          <p:cNvPr id="5" name="Объект 4">
+            <a:extLst>
+              <a:ext uri="{FF2B5EF4-FFF2-40B4-BE49-F238E27FC236}">
+                <a16:creationId xmlns:a16="http://schemas.microsoft.com/office/drawing/2014/main" id="{92B99C8A-AB97-793A-D096-FF305BB9F53D}"/>
+              </a:ext>
+            </a:extLst>
+          </p:cNvPr>
+          <p:cNvSpPr>
+            <a:spLocks noGrp="1"/>
+          </p:cNvSpPr>
+          <p:nvPr>
+            <p:ph idx="1"/>
           </p:nvPr>
         </p:nvSpPr>
         <p:spPr>
           <a:xfrm>
-            <a:off x="838200" y="341312"/>
-            <a:ext cx="10515600" cy="1325563"/>
+            <a:off x="838199" y="1503733"/>
+            <a:ext cx="4535906" cy="4415803"/>
           </a:xfrm>
         </p:spPr>
         <p:txBody>
@@ -5274,21 +5805,118 @@
           </a:bodyPr>
           <a:lstStyle/>
           <a:p>
-            <a:pPr algn="ctr"/>
-            <a:r>
-              <a:rPr lang="ru-RU" sz="6000"/>
-              <a:t>Спасибо за внимание!</a:t>
-            </a:r>
-            <a:endParaRPr lang="ru-RU" sz="6000" dirty="0"/>
+            <a:r>
+              <a:rPr lang="ru-RU" dirty="0"/>
+              <a:t>В </a:t>
+            </a:r>
+            <a:r>
+              <a:rPr lang="en-US" dirty="0"/>
+              <a:t>Rust () – </a:t>
+            </a:r>
+            <a:r>
+              <a:rPr lang="ru-RU" dirty="0"/>
+              <a:t>особый тип и значение, которое означает</a:t>
+            </a:r>
+          </a:p>
+          <a:p>
+            <a:pPr lvl="1"/>
+            <a:r>
+              <a:rPr lang="ru-RU" dirty="0"/>
+              <a:t>Пустой кортеж </a:t>
+            </a:r>
+          </a:p>
+          <a:p>
+            <a:pPr lvl="1"/>
+            <a:r>
+              <a:rPr lang="ru-RU" dirty="0"/>
+              <a:t>Отсутствие значения – функция</a:t>
+            </a:r>
+            <a:r>
+              <a:rPr lang="en-US" dirty="0"/>
+              <a:t>/</a:t>
+            </a:r>
+            <a:r>
+              <a:rPr lang="ru-RU" dirty="0"/>
+              <a:t>выражение не возвращает результата. Например, служит для определения</a:t>
+            </a:r>
+          </a:p>
+        </p:txBody>
+      </p:sp>
+      <p:sp>
+        <p:nvSpPr>
+          <p:cNvPr id="11" name="TextBox 10">
+            <a:extLst>
+              <a:ext uri="{FF2B5EF4-FFF2-40B4-BE49-F238E27FC236}">
+                <a16:creationId xmlns:a16="http://schemas.microsoft.com/office/drawing/2014/main" id="{3C6887BC-36A4-BCD8-3FEC-85FF4EC22C8B}"/>
+              </a:ext>
+            </a:extLst>
+          </p:cNvPr>
+          <p:cNvSpPr txBox="1"/>
+          <p:nvPr/>
+        </p:nvSpPr>
+        <p:spPr>
+          <a:xfrm>
+            <a:off x="5178162" y="5490671"/>
+            <a:ext cx="2467538" cy="1200329"/>
+          </a:xfrm>
+          <a:prstGeom prst="rect">
+            <a:avLst/>
+          </a:prstGeom>
+          <a:noFill/>
+        </p:spPr>
+        <p:txBody>
+          <a:bodyPr wrap="square">
+            <a:spAutoFit/>
+          </a:bodyPr>
+          <a:lstStyle/>
+          <a:p>
+            <a:r>
+              <a:rPr lang="en-US" u="sng" dirty="0">
+                <a:latin typeface="Courier New" panose="02070309020205020404" pitchFamily="49" charset="0"/>
+                <a:cs typeface="Courier New" panose="02070309020205020404" pitchFamily="49" charset="0"/>
+              </a:rPr>
+              <a:t>Console:</a:t>
+            </a:r>
+          </a:p>
+          <a:p>
+            <a:r>
+              <a:rPr lang="en-US" dirty="0">
+                <a:latin typeface="Courier New" panose="02070309020205020404" pitchFamily="49" charset="0"/>
+                <a:cs typeface="Courier New" panose="02070309020205020404" pitchFamily="49" charset="0"/>
+              </a:rPr>
+              <a:t>Empty tuple: ()</a:t>
+            </a:r>
+          </a:p>
+          <a:p>
+            <a:r>
+              <a:rPr lang="en-US" dirty="0">
+                <a:latin typeface="Courier New" panose="02070309020205020404" pitchFamily="49" charset="0"/>
+                <a:cs typeface="Courier New" panose="02070309020205020404" pitchFamily="49" charset="0"/>
+              </a:rPr>
+              <a:t>Hello, world!</a:t>
+            </a:r>
+          </a:p>
+          <a:p>
+            <a:r>
+              <a:rPr lang="en-US" dirty="0">
+                <a:latin typeface="Courier New" panose="02070309020205020404" pitchFamily="49" charset="0"/>
+                <a:cs typeface="Courier New" panose="02070309020205020404" pitchFamily="49" charset="0"/>
+              </a:rPr>
+              <a:t>Hello, world!</a:t>
+            </a:r>
+            <a:endParaRPr lang="ru-RU" dirty="0">
+              <a:latin typeface="Courier New" panose="02070309020205020404" pitchFamily="49" charset="0"/>
+              <a:cs typeface="Courier New" panose="02070309020205020404" pitchFamily="49" charset="0"/>
+            </a:endParaRPr>
           </a:p>
         </p:txBody>
       </p:sp>
       <p:pic>
         <p:nvPicPr>
-          <p:cNvPr id="5" name="Рисунок 4" descr="Изображение выглядит как текст, мультфильм, Мультфильм, снимок экрана&#10;&#10;Автоматически созданное описание">
-            <a:extLst>
-              <a:ext uri="{FF2B5EF4-FFF2-40B4-BE49-F238E27FC236}">
-                <a16:creationId xmlns:a16="http://schemas.microsoft.com/office/drawing/2014/main" id="{40D5377D-8B61-46EC-E60D-7BDC41D52DEA}"/>
+          <p:cNvPr id="13" name="Рисунок 12">
+            <a:extLst>
+              <a:ext uri="{FF2B5EF4-FFF2-40B4-BE49-F238E27FC236}">
+                <a16:creationId xmlns:a16="http://schemas.microsoft.com/office/drawing/2014/main" id="{78D05517-07A7-9A85-85B5-6307878F69A2}"/>
               </a:ext>
             </a:extLst>
           </p:cNvPr>
@@ -5298,21 +5926,15 @@
           <p:nvPr/>
         </p:nvPicPr>
         <p:blipFill>
-          <a:blip r:embed="rId2">
-            <a:extLst>
-              <a:ext uri="{28A0092B-C50C-407E-A947-70E740481C1C}">
-                <a14:useLocalDpi xmlns:a14="http://schemas.microsoft.com/office/drawing/2010/main" val="0"/>
-              </a:ext>
-            </a:extLst>
-          </a:blip>
+          <a:blip r:embed="rId2"/>
           <a:stretch>
             <a:fillRect/>
           </a:stretch>
         </p:blipFill>
         <p:spPr>
           <a:xfrm>
-            <a:off x="2616993" y="1495425"/>
-            <a:ext cx="6958013" cy="5218510"/>
+            <a:off x="5178162" y="1505494"/>
+            <a:ext cx="5063143" cy="3848773"/>
           </a:xfrm>
           <a:prstGeom prst="rect">
             <a:avLst/>
@@ -5322,7 +5944,513 @@
     </p:spTree>
     <p:extLst>
       <p:ext uri="{BB962C8B-B14F-4D97-AF65-F5344CB8AC3E}">
-        <p14:creationId xmlns:p14="http://schemas.microsoft.com/office/powerpoint/2010/main" val="2260275669"/>
+        <p14:creationId xmlns:p14="http://schemas.microsoft.com/office/powerpoint/2010/main" val="2910206101"/>
+      </p:ext>
+    </p:extLst>
+  </p:cSld>
+  <p:clrMapOvr>
+    <a:masterClrMapping/>
+  </p:clrMapOvr>
+</p:sld>
+</file>
+
+<file path=ppt/slides/slide8.xml><?xml version="1.0" encoding="utf-8"?>
+<p:sld xmlns:a="http://schemas.openxmlformats.org/drawingml/2006/main" xmlns:r="http://schemas.openxmlformats.org/officeDocument/2006/relationships" xmlns:p="http://schemas.openxmlformats.org/presentationml/2006/main">
+  <p:cSld>
+    <p:spTree>
+      <p:nvGrpSpPr>
+        <p:cNvPr id="1" name=""/>
+        <p:cNvGrpSpPr/>
+        <p:nvPr/>
+      </p:nvGrpSpPr>
+      <p:grpSpPr>
+        <a:xfrm>
+          <a:off x="0" y="0"/>
+          <a:ext cx="0" cy="0"/>
+          <a:chOff x="0" y="0"/>
+          <a:chExt cx="0" cy="0"/>
+        </a:xfrm>
+      </p:grpSpPr>
+      <p:sp>
+        <p:nvSpPr>
+          <p:cNvPr id="4" name="Заголовок 3">
+            <a:extLst>
+              <a:ext uri="{FF2B5EF4-FFF2-40B4-BE49-F238E27FC236}">
+                <a16:creationId xmlns:a16="http://schemas.microsoft.com/office/drawing/2014/main" id="{CE228031-626F-2E9C-A281-6879BD35A796}"/>
+              </a:ext>
+            </a:extLst>
+          </p:cNvPr>
+          <p:cNvSpPr>
+            <a:spLocks noGrp="1"/>
+          </p:cNvSpPr>
+          <p:nvPr>
+            <p:ph type="title"/>
+          </p:nvPr>
+        </p:nvSpPr>
+        <p:spPr/>
+        <p:txBody>
+          <a:bodyPr/>
+          <a:lstStyle/>
+          <a:p>
+            <a:r>
+              <a:rPr lang="en-US" dirty="0"/>
+              <a:t>() – </a:t>
+            </a:r>
+            <a:r>
+              <a:rPr lang="ru-RU" dirty="0"/>
+              <a:t>«единица измерения»</a:t>
+            </a:r>
+            <a:r>
+              <a:rPr lang="en-US" dirty="0"/>
+              <a:t>(unit) (2/2)</a:t>
+            </a:r>
+            <a:endParaRPr lang="ru-RU" dirty="0"/>
+          </a:p>
+        </p:txBody>
+      </p:sp>
+      <p:sp>
+        <p:nvSpPr>
+          <p:cNvPr id="5" name="Объект 4">
+            <a:extLst>
+              <a:ext uri="{FF2B5EF4-FFF2-40B4-BE49-F238E27FC236}">
+                <a16:creationId xmlns:a16="http://schemas.microsoft.com/office/drawing/2014/main" id="{92B99C8A-AB97-793A-D096-FF305BB9F53D}"/>
+              </a:ext>
+            </a:extLst>
+          </p:cNvPr>
+          <p:cNvSpPr>
+            <a:spLocks noGrp="1"/>
+          </p:cNvSpPr>
+          <p:nvPr>
+            <p:ph idx="1"/>
+          </p:nvPr>
+        </p:nvSpPr>
+        <p:spPr>
+          <a:xfrm>
+            <a:off x="614264" y="1480111"/>
+            <a:ext cx="4004389" cy="4415803"/>
+          </a:xfrm>
+        </p:spPr>
+        <p:txBody>
+          <a:bodyPr>
+            <a:normAutofit/>
+          </a:bodyPr>
+          <a:lstStyle/>
+          <a:p>
+            <a:r>
+              <a:rPr lang="ru-RU" dirty="0"/>
+              <a:t>В </a:t>
+            </a:r>
+            <a:r>
+              <a:rPr lang="en-US" dirty="0"/>
+              <a:t>Rust () – </a:t>
+            </a:r>
+            <a:r>
+              <a:rPr lang="ru-RU" dirty="0"/>
+              <a:t>особый тип и значение, которое означает</a:t>
+            </a:r>
+          </a:p>
+          <a:p>
+            <a:pPr lvl="1"/>
+            <a:r>
+              <a:rPr lang="ru-RU" dirty="0"/>
+              <a:t>Распространённый тип макросов (например, генерация кода)</a:t>
+            </a:r>
+            <a:endParaRPr lang="en-US" dirty="0"/>
+          </a:p>
+          <a:p>
+            <a:pPr lvl="1"/>
+            <a:r>
+              <a:rPr lang="ru-RU" dirty="0"/>
+              <a:t>Заполнитель шаблонов</a:t>
+            </a:r>
+            <a:endParaRPr lang="en-US" dirty="0"/>
+          </a:p>
+          <a:p>
+            <a:pPr lvl="1"/>
+            <a:endParaRPr lang="ru-RU" dirty="0"/>
+          </a:p>
+        </p:txBody>
+      </p:sp>
+      <p:sp>
+        <p:nvSpPr>
+          <p:cNvPr id="11" name="TextBox 10">
+            <a:extLst>
+              <a:ext uri="{FF2B5EF4-FFF2-40B4-BE49-F238E27FC236}">
+                <a16:creationId xmlns:a16="http://schemas.microsoft.com/office/drawing/2014/main" id="{3C6887BC-36A4-BCD8-3FEC-85FF4EC22C8B}"/>
+              </a:ext>
+            </a:extLst>
+          </p:cNvPr>
+          <p:cNvSpPr txBox="1"/>
+          <p:nvPr/>
+        </p:nvSpPr>
+        <p:spPr>
+          <a:xfrm>
+            <a:off x="8415767" y="1503733"/>
+            <a:ext cx="3903492" cy="1569660"/>
+          </a:xfrm>
+          <a:prstGeom prst="rect">
+            <a:avLst/>
+          </a:prstGeom>
+          <a:noFill/>
+        </p:spPr>
+        <p:txBody>
+          <a:bodyPr wrap="square">
+            <a:spAutoFit/>
+          </a:bodyPr>
+          <a:lstStyle/>
+          <a:p>
+            <a:r>
+              <a:rPr lang="en-US" sz="1600" u="sng" dirty="0">
+                <a:latin typeface="Courier New" panose="02070309020205020404" pitchFamily="49" charset="0"/>
+                <a:cs typeface="Courier New" panose="02070309020205020404" pitchFamily="49" charset="0"/>
+              </a:rPr>
+              <a:t>Console:</a:t>
+            </a:r>
+          </a:p>
+          <a:p>
+            <a:r>
+              <a:rPr lang="en-US" sz="1600" dirty="0">
+                <a:latin typeface="Courier New" panose="02070309020205020404" pitchFamily="49" charset="0"/>
+                <a:cs typeface="Courier New" panose="02070309020205020404" pitchFamily="49" charset="0"/>
+              </a:rPr>
+              <a:t>thread 'main' panicked at 'assertion failed: `(left == right)`</a:t>
+            </a:r>
+          </a:p>
+          <a:p>
+            <a:r>
+              <a:rPr lang="en-US" sz="1600" dirty="0">
+                <a:latin typeface="Courier New" panose="02070309020205020404" pitchFamily="49" charset="0"/>
+                <a:cs typeface="Courier New" panose="02070309020205020404" pitchFamily="49" charset="0"/>
+              </a:rPr>
+              <a:t>  left: `2`,</a:t>
+            </a:r>
+          </a:p>
+          <a:p>
+            <a:r>
+              <a:rPr lang="en-US" sz="1600" dirty="0">
+                <a:latin typeface="Courier New" panose="02070309020205020404" pitchFamily="49" charset="0"/>
+                <a:cs typeface="Courier New" panose="02070309020205020404" pitchFamily="49" charset="0"/>
+              </a:rPr>
+              <a:t> right: `3`', </a:t>
+            </a:r>
+            <a:r>
+              <a:rPr lang="en-US" sz="1600" dirty="0" err="1">
+                <a:latin typeface="Courier New" panose="02070309020205020404" pitchFamily="49" charset="0"/>
+                <a:cs typeface="Courier New" panose="02070309020205020404" pitchFamily="49" charset="0"/>
+              </a:rPr>
+              <a:t>src</a:t>
+            </a:r>
+            <a:r>
+              <a:rPr lang="en-US" sz="1600" dirty="0">
+                <a:latin typeface="Courier New" panose="02070309020205020404" pitchFamily="49" charset="0"/>
+                <a:cs typeface="Courier New" panose="02070309020205020404" pitchFamily="49" charset="0"/>
+              </a:rPr>
+              <a:t>/main.rs:52:5</a:t>
+            </a:r>
+            <a:endParaRPr lang="ru-RU" sz="1600" dirty="0">
+              <a:latin typeface="Courier New" panose="02070309020205020404" pitchFamily="49" charset="0"/>
+              <a:cs typeface="Courier New" panose="02070309020205020404" pitchFamily="49" charset="0"/>
+            </a:endParaRPr>
+          </a:p>
+        </p:txBody>
+      </p:sp>
+      <p:pic>
+        <p:nvPicPr>
+          <p:cNvPr id="3" name="Рисунок 2">
+            <a:extLst>
+              <a:ext uri="{FF2B5EF4-FFF2-40B4-BE49-F238E27FC236}">
+                <a16:creationId xmlns:a16="http://schemas.microsoft.com/office/drawing/2014/main" id="{5411D2BC-C33C-3862-DCE6-2BD0A5D6CDEC}"/>
+              </a:ext>
+            </a:extLst>
+          </p:cNvPr>
+          <p:cNvPicPr>
+            <a:picLocks noChangeAspect="1"/>
+          </p:cNvPicPr>
+          <p:nvPr/>
+        </p:nvPicPr>
+        <p:blipFill>
+          <a:blip r:embed="rId2"/>
+          <a:stretch>
+            <a:fillRect/>
+          </a:stretch>
+        </p:blipFill>
+        <p:spPr>
+          <a:xfrm>
+            <a:off x="4691349" y="1487937"/>
+            <a:ext cx="3724418" cy="2223697"/>
+          </a:xfrm>
+          <a:prstGeom prst="rect">
+            <a:avLst/>
+          </a:prstGeom>
+        </p:spPr>
+      </p:pic>
+      <p:sp>
+        <p:nvSpPr>
+          <p:cNvPr id="14" name="TextBox 13">
+            <a:extLst>
+              <a:ext uri="{FF2B5EF4-FFF2-40B4-BE49-F238E27FC236}">
+                <a16:creationId xmlns:a16="http://schemas.microsoft.com/office/drawing/2014/main" id="{608A855B-C2C6-FF11-EFAA-F93F0A5379EF}"/>
+              </a:ext>
+            </a:extLst>
+          </p:cNvPr>
+          <p:cNvSpPr txBox="1"/>
+          <p:nvPr/>
+        </p:nvSpPr>
+        <p:spPr>
+          <a:xfrm>
+            <a:off x="8415767" y="3733140"/>
+            <a:ext cx="1684420" cy="646331"/>
+          </a:xfrm>
+          <a:prstGeom prst="rect">
+            <a:avLst/>
+          </a:prstGeom>
+          <a:noFill/>
+        </p:spPr>
+        <p:txBody>
+          <a:bodyPr wrap="square" rtlCol="0">
+            <a:spAutoFit/>
+          </a:bodyPr>
+          <a:lstStyle/>
+          <a:p>
+            <a:r>
+              <a:rPr lang="en-US" u="sng" dirty="0">
+                <a:latin typeface="Courier New" panose="02070309020205020404" pitchFamily="49" charset="0"/>
+                <a:cs typeface="Courier New" panose="02070309020205020404" pitchFamily="49" charset="0"/>
+              </a:rPr>
+              <a:t>Console:</a:t>
+            </a:r>
+          </a:p>
+          <a:p>
+            <a:r>
+              <a:rPr lang="en-US" dirty="0">
+                <a:latin typeface="Courier New" panose="02070309020205020404" pitchFamily="49" charset="0"/>
+                <a:cs typeface="Courier New" panose="02070309020205020404" pitchFamily="49" charset="0"/>
+              </a:rPr>
+              <a:t>Other</a:t>
+            </a:r>
+            <a:endParaRPr lang="ru-RU" dirty="0">
+              <a:latin typeface="Courier New" panose="02070309020205020404" pitchFamily="49" charset="0"/>
+              <a:cs typeface="Courier New" panose="02070309020205020404" pitchFamily="49" charset="0"/>
+            </a:endParaRPr>
+          </a:p>
+        </p:txBody>
+      </p:sp>
+      <p:pic>
+        <p:nvPicPr>
+          <p:cNvPr id="16" name="Рисунок 15">
+            <a:extLst>
+              <a:ext uri="{FF2B5EF4-FFF2-40B4-BE49-F238E27FC236}">
+                <a16:creationId xmlns:a16="http://schemas.microsoft.com/office/drawing/2014/main" id="{381CEEBD-D94D-8680-4921-0AC649B0F8D4}"/>
+              </a:ext>
+            </a:extLst>
+          </p:cNvPr>
+          <p:cNvPicPr>
+            <a:picLocks noChangeAspect="1"/>
+          </p:cNvPicPr>
+          <p:nvPr/>
+        </p:nvPicPr>
+        <p:blipFill>
+          <a:blip r:embed="rId3"/>
+          <a:stretch>
+            <a:fillRect/>
+          </a:stretch>
+        </p:blipFill>
+        <p:spPr>
+          <a:xfrm>
+            <a:off x="4691349" y="3616020"/>
+            <a:ext cx="3724418" cy="3241980"/>
+          </a:xfrm>
+          <a:prstGeom prst="rect">
+            <a:avLst/>
+          </a:prstGeom>
+        </p:spPr>
+      </p:pic>
+    </p:spTree>
+    <p:extLst>
+      <p:ext uri="{BB962C8B-B14F-4D97-AF65-F5344CB8AC3E}">
+        <p14:creationId xmlns:p14="http://schemas.microsoft.com/office/powerpoint/2010/main" val="308378217"/>
+      </p:ext>
+    </p:extLst>
+  </p:cSld>
+  <p:clrMapOvr>
+    <a:masterClrMapping/>
+  </p:clrMapOvr>
+</p:sld>
+</file>
+
+<file path=ppt/slides/slide9.xml><?xml version="1.0" encoding="utf-8"?>
+<p:sld xmlns:a="http://schemas.openxmlformats.org/drawingml/2006/main" xmlns:r="http://schemas.openxmlformats.org/officeDocument/2006/relationships" xmlns:p="http://schemas.openxmlformats.org/presentationml/2006/main">
+  <p:cSld>
+    <p:spTree>
+      <p:nvGrpSpPr>
+        <p:cNvPr id="1" name=""/>
+        <p:cNvGrpSpPr/>
+        <p:nvPr/>
+      </p:nvGrpSpPr>
+      <p:grpSpPr>
+        <a:xfrm>
+          <a:off x="0" y="0"/>
+          <a:ext cx="0" cy="0"/>
+          <a:chOff x="0" y="0"/>
+          <a:chExt cx="0" cy="0"/>
+        </a:xfrm>
+      </p:grpSpPr>
+      <p:sp>
+        <p:nvSpPr>
+          <p:cNvPr id="4" name="Заголовок 3">
+            <a:extLst>
+              <a:ext uri="{FF2B5EF4-FFF2-40B4-BE49-F238E27FC236}">
+                <a16:creationId xmlns:a16="http://schemas.microsoft.com/office/drawing/2014/main" id="{CE228031-626F-2E9C-A281-6879BD35A796}"/>
+              </a:ext>
+            </a:extLst>
+          </p:cNvPr>
+          <p:cNvSpPr>
+            <a:spLocks noGrp="1"/>
+          </p:cNvSpPr>
+          <p:nvPr>
+            <p:ph type="title"/>
+          </p:nvPr>
+        </p:nvSpPr>
+        <p:spPr/>
+        <p:txBody>
+          <a:bodyPr/>
+          <a:lstStyle/>
+          <a:p>
+            <a:r>
+              <a:rPr lang="ru-RU" dirty="0"/>
+              <a:t>Выходные данные</a:t>
+            </a:r>
+          </a:p>
+        </p:txBody>
+      </p:sp>
+      <p:sp>
+        <p:nvSpPr>
+          <p:cNvPr id="5" name="Объект 4">
+            <a:extLst>
+              <a:ext uri="{FF2B5EF4-FFF2-40B4-BE49-F238E27FC236}">
+                <a16:creationId xmlns:a16="http://schemas.microsoft.com/office/drawing/2014/main" id="{92B99C8A-AB97-793A-D096-FF305BB9F53D}"/>
+              </a:ext>
+            </a:extLst>
+          </p:cNvPr>
+          <p:cNvSpPr>
+            <a:spLocks noGrp="1"/>
+          </p:cNvSpPr>
+          <p:nvPr>
+            <p:ph idx="1"/>
+          </p:nvPr>
+        </p:nvSpPr>
+        <p:spPr>
+          <a:xfrm>
+            <a:off x="981075" y="1461544"/>
+            <a:ext cx="5410200" cy="4648994"/>
+          </a:xfrm>
+        </p:spPr>
+        <p:txBody>
+          <a:bodyPr>
+            <a:normAutofit/>
+          </a:bodyPr>
+          <a:lstStyle/>
+          <a:p>
+            <a:r>
+              <a:rPr lang="ru-RU" dirty="0"/>
+              <a:t>Последнее выражение в функции используется, как возвращаемое значение. </a:t>
+            </a:r>
+            <a:endParaRPr lang="en-US" dirty="0"/>
+          </a:p>
+          <a:p>
+            <a:r>
+              <a:rPr lang="ru-RU" dirty="0"/>
+              <a:t>Также используется оператор </a:t>
+            </a:r>
+            <a:r>
+              <a:rPr lang="en-US" b="1" dirty="0">
+                <a:solidFill>
+                  <a:schemeClr val="accent1"/>
+                </a:solidFill>
+              </a:rPr>
+              <a:t>return </a:t>
+            </a:r>
+            <a:r>
+              <a:rPr lang="en-US" dirty="0"/>
+              <a:t>(</a:t>
+            </a:r>
+            <a:r>
+              <a:rPr lang="ru-RU" dirty="0"/>
+              <a:t>чтобы вернуть значение раньше: из цикла или оператора </a:t>
+            </a:r>
+            <a:r>
+              <a:rPr lang="en-US" dirty="0"/>
+              <a:t>if).</a:t>
+            </a:r>
+          </a:p>
+          <a:p>
+            <a:r>
+              <a:rPr lang="ru-RU" dirty="0"/>
+              <a:t>Функции, которые «не» возвращают значение</a:t>
+            </a:r>
+            <a:r>
+              <a:rPr lang="en-US" dirty="0"/>
+              <a:t> – </a:t>
+            </a:r>
+            <a:r>
+              <a:rPr lang="ru-RU" dirty="0"/>
+              <a:t>возвращают единичный тип </a:t>
+            </a:r>
+            <a:r>
+              <a:rPr lang="ru-RU" b="1" dirty="0">
+                <a:solidFill>
+                  <a:schemeClr val="accent1"/>
+                </a:solidFill>
+              </a:rPr>
+              <a:t>()</a:t>
+            </a:r>
+          </a:p>
+          <a:p>
+            <a:pPr marL="0" indent="0">
+              <a:buNone/>
+            </a:pPr>
+            <a:endParaRPr lang="ru-RU" b="1" dirty="0">
+              <a:solidFill>
+                <a:schemeClr val="accent1"/>
+              </a:solidFill>
+            </a:endParaRPr>
+          </a:p>
+        </p:txBody>
+      </p:sp>
+      <p:pic>
+        <p:nvPicPr>
+          <p:cNvPr id="13" name="Рисунок 12">
+            <a:extLst>
+              <a:ext uri="{FF2B5EF4-FFF2-40B4-BE49-F238E27FC236}">
+                <a16:creationId xmlns:a16="http://schemas.microsoft.com/office/drawing/2014/main" id="{FA37723E-A1E7-1476-23F0-D72B70973935}"/>
+              </a:ext>
+            </a:extLst>
+          </p:cNvPr>
+          <p:cNvPicPr>
+            <a:picLocks noChangeAspect="1"/>
+          </p:cNvPicPr>
+          <p:nvPr/>
+        </p:nvPicPr>
+        <p:blipFill>
+          <a:blip r:embed="rId2"/>
+          <a:stretch>
+            <a:fillRect/>
+          </a:stretch>
+        </p:blipFill>
+        <p:spPr>
+          <a:xfrm>
+            <a:off x="6809680" y="1461544"/>
+            <a:ext cx="5410201" cy="4860889"/>
+          </a:xfrm>
+          <a:prstGeom prst="rect">
+            <a:avLst/>
+          </a:prstGeom>
+        </p:spPr>
+      </p:pic>
+    </p:spTree>
+    <p:extLst>
+      <p:ext uri="{BB962C8B-B14F-4D97-AF65-F5344CB8AC3E}">
+        <p14:creationId xmlns:p14="http://schemas.microsoft.com/office/powerpoint/2010/main" val="3652688790"/>
       </p:ext>
     </p:extLst>
   </p:cSld>

</xml_diff>